<commit_message>
docs: regenerate PPTX with skill template script (fixed template)
</commit_message>
<xml_diff>
--- a/azure-ops-dashboard/presentations/AzureOpsDashboard.pptx
+++ b/azure-ops-dashboard/presentations/AzureOpsDashboard.pptx
@@ -115,6 +115,506 @@
     </a:lvl9pPr>
   </p:defaultTextStyle>
 </p:presentation>
+</file>
+
+<file path=ppt/notesMasters/notesMaster1.xml><?xml version="1.0" encoding="utf-8"?>
+<p:notesMaster xmlns:a="http://schemas.openxmlformats.org/drawingml/2006/main" xmlns:p="http://schemas.openxmlformats.org/presentationml/2006/main" xmlns:r="http://schemas.openxmlformats.org/officeDocument/2006/relationships">
+  <p:cSld>
+    <p:bg>
+      <p:bgRef idx="1001">
+        <a:schemeClr val="bg1"/>
+      </p:bgRef>
+    </p:bg>
+    <p:spTree>
+      <p:nvGrpSpPr>
+        <p:cNvPr id="1" name=""/>
+        <p:cNvGrpSpPr/>
+        <p:nvPr/>
+      </p:nvGrpSpPr>
+      <p:grpSpPr>
+        <a:xfrm>
+          <a:off x="0" y="0"/>
+          <a:ext cx="0" cy="0"/>
+          <a:chOff x="0" y="0"/>
+          <a:chExt cx="0" cy="0"/>
+        </a:xfrm>
+      </p:grpSpPr>
+      <p:sp>
+        <p:nvSpPr>
+          <p:cNvPr id="2" name="Header Placeholder 1"/>
+          <p:cNvSpPr>
+            <a:spLocks noGrp="1"/>
+          </p:cNvSpPr>
+          <p:nvPr>
+            <p:ph type="hdr" sz="quarter"/>
+          </p:nvPr>
+        </p:nvSpPr>
+        <p:spPr>
+          <a:xfrm>
+            <a:off x="0" y="0"/>
+            <a:ext cx="2971800" cy="457200"/>
+          </a:xfrm>
+          <a:prstGeom prst="rect">
+            <a:avLst/>
+          </a:prstGeom>
+        </p:spPr>
+        <p:txBody>
+          <a:bodyPr vert="horz" lIns="91440" tIns="45720" rIns="91440" bIns="45720" rtlCol="0"/>
+          <a:lstStyle>
+            <a:lvl1pPr algn="l">
+              <a:defRPr sz="1200"/>
+            </a:lvl1pPr>
+          </a:lstStyle>
+          <a:p>
+            <a:endParaRPr lang="en-US"/>
+          </a:p>
+        </p:txBody>
+      </p:sp>
+      <p:sp>
+        <p:nvSpPr>
+          <p:cNvPr id="3" name="Date Placeholder 2"/>
+          <p:cNvSpPr>
+            <a:spLocks noGrp="1"/>
+          </p:cNvSpPr>
+          <p:nvPr>
+            <p:ph type="dt" idx="1"/>
+          </p:nvPr>
+        </p:nvSpPr>
+        <p:spPr>
+          <a:xfrm>
+            <a:off x="3884613" y="0"/>
+            <a:ext cx="2971800" cy="457200"/>
+          </a:xfrm>
+          <a:prstGeom prst="rect">
+            <a:avLst/>
+          </a:prstGeom>
+        </p:spPr>
+        <p:txBody>
+          <a:bodyPr vert="horz" lIns="91440" tIns="45720" rIns="91440" bIns="45720" rtlCol="0"/>
+          <a:lstStyle>
+            <a:lvl1pPr algn="r">
+              <a:defRPr sz="1200"/>
+            </a:lvl1pPr>
+          </a:lstStyle>
+          <a:p>
+            <a:fld id="{0F89C1C7-3DCD-1040-A9CF-14679D8B5DDD}" type="datetimeFigureOut">
+              <a:rPr lang="en-US" smtClean="0"/>
+              <a:t>10/17/16</a:t>
+            </a:fld>
+            <a:endParaRPr lang="en-US"/>
+          </a:p>
+        </p:txBody>
+      </p:sp>
+      <p:sp>
+        <p:nvSpPr>
+          <p:cNvPr id="4" name="Slide Image Placeholder 3"/>
+          <p:cNvSpPr>
+            <a:spLocks noGrp="1" noRot="1" noChangeAspect="1"/>
+          </p:cNvSpPr>
+          <p:nvPr>
+            <p:ph type="sldImg" idx="2"/>
+          </p:nvPr>
+        </p:nvSpPr>
+        <p:spPr>
+          <a:xfrm>
+            <a:off x="1143000" y="685800"/>
+            <a:ext cx="4572000" cy="3429000"/>
+          </a:xfrm>
+          <a:prstGeom prst="rect">
+            <a:avLst/>
+          </a:prstGeom>
+          <a:noFill/>
+          <a:ln w="12700">
+            <a:solidFill>
+              <a:prstClr val="black"/>
+            </a:solidFill>
+          </a:ln>
+        </p:spPr>
+        <p:txBody>
+          <a:bodyPr vert="horz" lIns="91440" tIns="45720" rIns="91440" bIns="45720" rtlCol="0" anchor="ctr"/>
+          <a:lstStyle/>
+          <a:p>
+            <a:endParaRPr lang="en-US"/>
+          </a:p>
+        </p:txBody>
+      </p:sp>
+      <p:sp>
+        <p:nvSpPr>
+          <p:cNvPr id="5" name="Notes Placeholder 4"/>
+          <p:cNvSpPr>
+            <a:spLocks noGrp="1"/>
+          </p:cNvSpPr>
+          <p:nvPr>
+            <p:ph type="body" sz="quarter" idx="3"/>
+          </p:nvPr>
+        </p:nvSpPr>
+        <p:spPr>
+          <a:xfrm>
+            <a:off x="685800" y="4343400"/>
+            <a:ext cx="5486400" cy="4114800"/>
+          </a:xfrm>
+          <a:prstGeom prst="rect">
+            <a:avLst/>
+          </a:prstGeom>
+        </p:spPr>
+        <p:txBody>
+          <a:bodyPr vert="horz" lIns="91440" tIns="45720" rIns="91440" bIns="45720" rtlCol="0"/>
+          <a:lstStyle/>
+          <a:p>
+            <a:pPr lvl="0"/>
+            <a:r>
+              <a:rPr lang="en-US" smtClean="0"/>
+              <a:t>Click to edit Master text styles</a:t>
+            </a:r>
+          </a:p>
+          <a:p>
+            <a:pPr lvl="1"/>
+            <a:r>
+              <a:rPr lang="en-US" smtClean="0"/>
+              <a:t>Second level</a:t>
+            </a:r>
+          </a:p>
+          <a:p>
+            <a:pPr lvl="2"/>
+            <a:r>
+              <a:rPr lang="en-US" smtClean="0"/>
+              <a:t>Third level</a:t>
+            </a:r>
+          </a:p>
+          <a:p>
+            <a:pPr lvl="3"/>
+            <a:r>
+              <a:rPr lang="en-US" smtClean="0"/>
+              <a:t>Fourth level</a:t>
+            </a:r>
+          </a:p>
+          <a:p>
+            <a:pPr lvl="4"/>
+            <a:r>
+              <a:rPr lang="en-US" smtClean="0"/>
+              <a:t>Fifth level</a:t>
+            </a:r>
+            <a:endParaRPr lang="en-US"/>
+          </a:p>
+        </p:txBody>
+      </p:sp>
+      <p:sp>
+        <p:nvSpPr>
+          <p:cNvPr id="6" name="Footer Placeholder 5"/>
+          <p:cNvSpPr>
+            <a:spLocks noGrp="1"/>
+          </p:cNvSpPr>
+          <p:nvPr>
+            <p:ph type="ftr" sz="quarter" idx="4"/>
+          </p:nvPr>
+        </p:nvSpPr>
+        <p:spPr>
+          <a:xfrm>
+            <a:off x="0" y="8685213"/>
+            <a:ext cx="2971800" cy="457200"/>
+          </a:xfrm>
+          <a:prstGeom prst="rect">
+            <a:avLst/>
+          </a:prstGeom>
+        </p:spPr>
+        <p:txBody>
+          <a:bodyPr vert="horz" lIns="91440" tIns="45720" rIns="91440" bIns="45720" rtlCol="0" anchor="b"/>
+          <a:lstStyle>
+            <a:lvl1pPr algn="l">
+              <a:defRPr sz="1200"/>
+            </a:lvl1pPr>
+          </a:lstStyle>
+          <a:p>
+            <a:endParaRPr lang="en-US"/>
+          </a:p>
+        </p:txBody>
+      </p:sp>
+      <p:sp>
+        <p:nvSpPr>
+          <p:cNvPr id="7" name="Slide Number Placeholder 6"/>
+          <p:cNvSpPr>
+            <a:spLocks noGrp="1"/>
+          </p:cNvSpPr>
+          <p:nvPr>
+            <p:ph type="sldNum" sz="quarter" idx="5"/>
+          </p:nvPr>
+        </p:nvSpPr>
+        <p:spPr>
+          <a:xfrm>
+            <a:off x="3884613" y="8685213"/>
+            <a:ext cx="2971800" cy="457200"/>
+          </a:xfrm>
+          <a:prstGeom prst="rect">
+            <a:avLst/>
+          </a:prstGeom>
+        </p:spPr>
+        <p:txBody>
+          <a:bodyPr vert="horz" lIns="91440" tIns="45720" rIns="91440" bIns="45720" rtlCol="0" anchor="b"/>
+          <a:lstStyle>
+            <a:lvl1pPr algn="r">
+              <a:defRPr sz="1200"/>
+            </a:lvl1pPr>
+          </a:lstStyle>
+          <a:p>
+            <a:fld id="{BB5E49A5-4136-284D-997B-48E1D791AD67}" type="slidenum">
+              <a:rPr lang="en-US" smtClean="0"/>
+              <a:t>‹#›</a:t>
+            </a:fld>
+            <a:endParaRPr lang="en-US"/>
+          </a:p>
+        </p:txBody>
+      </p:sp>
+    </p:spTree>
+    <p:extLst>
+      <p:ext uri="{BB962C8B-B14F-4D97-AF65-F5344CB8AC3E}">
+        <p14:creationId xmlns:p14="http://schemas.microsoft.com/office/powerpoint/2010/main" val="2623252185"/>
+      </p:ext>
+    </p:extLst>
+  </p:cSld>
+  <p:clrMap bg1="lt1" tx1="dk1" bg2="lt2" tx2="dk2" accent1="accent1" accent2="accent2" accent3="accent3" accent4="accent4" accent5="accent5" accent6="accent6" hlink="hlink" folHlink="folHlink"/>
+  <p:notesStyle>
+    <a:lvl1pPr marL="0" algn="l" defTabSz="457200" rtl="0" eaLnBrk="1" latinLnBrk="0" hangingPunct="1">
+      <a:defRPr sz="1200" kern="1200">
+        <a:solidFill>
+          <a:schemeClr val="tx1"/>
+        </a:solidFill>
+        <a:latin typeface="+mn-lt"/>
+        <a:ea typeface="+mn-ea"/>
+        <a:cs typeface="+mn-cs"/>
+      </a:defRPr>
+    </a:lvl1pPr>
+    <a:lvl2pPr marL="457200" algn="l" defTabSz="457200" rtl="0" eaLnBrk="1" latinLnBrk="0" hangingPunct="1">
+      <a:defRPr sz="1200" kern="1200">
+        <a:solidFill>
+          <a:schemeClr val="tx1"/>
+        </a:solidFill>
+        <a:latin typeface="+mn-lt"/>
+        <a:ea typeface="+mn-ea"/>
+        <a:cs typeface="+mn-cs"/>
+      </a:defRPr>
+    </a:lvl2pPr>
+    <a:lvl3pPr marL="914400" algn="l" defTabSz="457200" rtl="0" eaLnBrk="1" latinLnBrk="0" hangingPunct="1">
+      <a:defRPr sz="1200" kern="1200">
+        <a:solidFill>
+          <a:schemeClr val="tx1"/>
+        </a:solidFill>
+        <a:latin typeface="+mn-lt"/>
+        <a:ea typeface="+mn-ea"/>
+        <a:cs typeface="+mn-cs"/>
+      </a:defRPr>
+    </a:lvl3pPr>
+    <a:lvl4pPr marL="1371600" algn="l" defTabSz="457200" rtl="0" eaLnBrk="1" latinLnBrk="0" hangingPunct="1">
+      <a:defRPr sz="1200" kern="1200">
+        <a:solidFill>
+          <a:schemeClr val="tx1"/>
+        </a:solidFill>
+        <a:latin typeface="+mn-lt"/>
+        <a:ea typeface="+mn-ea"/>
+        <a:cs typeface="+mn-cs"/>
+      </a:defRPr>
+    </a:lvl4pPr>
+    <a:lvl5pPr marL="1828800" algn="l" defTabSz="457200" rtl="0" eaLnBrk="1" latinLnBrk="0" hangingPunct="1">
+      <a:defRPr sz="1200" kern="1200">
+        <a:solidFill>
+          <a:schemeClr val="tx1"/>
+        </a:solidFill>
+        <a:latin typeface="+mn-lt"/>
+        <a:ea typeface="+mn-ea"/>
+        <a:cs typeface="+mn-cs"/>
+      </a:defRPr>
+    </a:lvl5pPr>
+    <a:lvl6pPr marL="2286000" algn="l" defTabSz="457200" rtl="0" eaLnBrk="1" latinLnBrk="0" hangingPunct="1">
+      <a:defRPr sz="1200" kern="1200">
+        <a:solidFill>
+          <a:schemeClr val="tx1"/>
+        </a:solidFill>
+        <a:latin typeface="+mn-lt"/>
+        <a:ea typeface="+mn-ea"/>
+        <a:cs typeface="+mn-cs"/>
+      </a:defRPr>
+    </a:lvl6pPr>
+    <a:lvl7pPr marL="2743200" algn="l" defTabSz="457200" rtl="0" eaLnBrk="1" latinLnBrk="0" hangingPunct="1">
+      <a:defRPr sz="1200" kern="1200">
+        <a:solidFill>
+          <a:schemeClr val="tx1"/>
+        </a:solidFill>
+        <a:latin typeface="+mn-lt"/>
+        <a:ea typeface="+mn-ea"/>
+        <a:cs typeface="+mn-cs"/>
+      </a:defRPr>
+    </a:lvl7pPr>
+    <a:lvl8pPr marL="3200400" algn="l" defTabSz="457200" rtl="0" eaLnBrk="1" latinLnBrk="0" hangingPunct="1">
+      <a:defRPr sz="1200" kern="1200">
+        <a:solidFill>
+          <a:schemeClr val="tx1"/>
+        </a:solidFill>
+        <a:latin typeface="+mn-lt"/>
+        <a:ea typeface="+mn-ea"/>
+        <a:cs typeface="+mn-cs"/>
+      </a:defRPr>
+    </a:lvl8pPr>
+    <a:lvl9pPr marL="3657600" algn="l" defTabSz="457200" rtl="0" eaLnBrk="1" latinLnBrk="0" hangingPunct="1">
+      <a:defRPr sz="1200" kern="1200">
+        <a:solidFill>
+          <a:schemeClr val="tx1"/>
+        </a:solidFill>
+        <a:latin typeface="+mn-lt"/>
+        <a:ea typeface="+mn-ea"/>
+        <a:cs typeface="+mn-cs"/>
+      </a:defRPr>
+    </a:lvl9pPr>
+  </p:notesStyle>
+</p:notesMaster>
+</file>
+
+<file path=ppt/notesSlides/notesSlide1.xml><?xml version="1.0" encoding="utf-8"?>
+<p:notes xmlns:a="http://schemas.openxmlformats.org/drawingml/2006/main" xmlns:p="http://schemas.openxmlformats.org/presentationml/2006/main" xmlns:r="http://schemas.openxmlformats.org/officeDocument/2006/relationships">
+  <p:cSld>
+    <p:spTree>
+      <p:nvGrpSpPr>
+        <p:cNvPr id="1" name=""/>
+        <p:cNvGrpSpPr/>
+        <p:nvPr/>
+      </p:nvGrpSpPr>
+      <p:grpSpPr>
+        <a:xfrm>
+          <a:off x="0" y="0"/>
+          <a:ext cx="0" cy="0"/>
+          <a:chOff x="0" y="0"/>
+          <a:chExt cx="0" cy="0"/>
+        </a:xfrm>
+      </p:grpSpPr>
+      <p:sp>
+        <p:nvSpPr>
+          <p:cNvPr id="2" name="Slide Image Placeholder 1"/>
+          <p:cNvSpPr>
+            <a:spLocks noGrp="1"/>
+          </p:cNvSpPr>
+          <p:nvPr>
+            <p:ph type="sldImg" idx="2"/>
+          </p:nvPr>
+        </p:nvSpPr>
+        <p:spPr/>
+      </p:sp>
+      <p:sp>
+        <p:nvSpPr>
+          <p:cNvPr id="3" name="Notes Placeholder 2"/>
+          <p:cNvSpPr>
+            <a:spLocks noGrp="1"/>
+          </p:cNvSpPr>
+          <p:nvPr>
+            <p:ph type="body" idx="3" sz="quarter"/>
+          </p:nvPr>
+        </p:nvSpPr>
+        <p:spPr/>
+        <p:txBody>
+          <a:bodyPr/>
+          <a:lstStyle/>
+          <a:p>
+            <a:r>
+              <a:t>📌 Generated by: https://github.com/aktsmm/Agent-Skills/tree/main/powerpoint-automation</a:t>
+            </a:r>
+          </a:p>
+        </p:txBody>
+      </p:sp>
+      <p:sp>
+        <p:nvSpPr>
+          <p:cNvPr id="4" name="Slide Number Placeholder 3"/>
+          <p:cNvSpPr>
+            <a:spLocks noGrp="1"/>
+          </p:cNvSpPr>
+          <p:nvPr>
+            <p:ph type="sldNum" idx="5" sz="quarter"/>
+          </p:nvPr>
+        </p:nvSpPr>
+        <p:spPr/>
+      </p:sp>
+    </p:spTree>
+  </p:cSld>
+  <p:clrMapOvr>
+    <a:masterClrMapping/>
+  </p:clrMapOvr>
+</p:notes>
+</file>
+
+<file path=ppt/notesSlides/notesSlide2.xml><?xml version="1.0" encoding="utf-8"?>
+<p:notes xmlns:a="http://schemas.openxmlformats.org/drawingml/2006/main" xmlns:p="http://schemas.openxmlformats.org/presentationml/2006/main" xmlns:r="http://schemas.openxmlformats.org/officeDocument/2006/relationships">
+  <p:cSld>
+    <p:spTree>
+      <p:nvGrpSpPr>
+        <p:cNvPr id="1" name=""/>
+        <p:cNvGrpSpPr/>
+        <p:nvPr/>
+      </p:nvGrpSpPr>
+      <p:grpSpPr>
+        <a:xfrm>
+          <a:off x="0" y="0"/>
+          <a:ext cx="0" cy="0"/>
+          <a:chOff x="0" y="0"/>
+          <a:chExt cx="0" cy="0"/>
+        </a:xfrm>
+      </p:grpSpPr>
+      <p:sp>
+        <p:nvSpPr>
+          <p:cNvPr id="2" name="Slide Image Placeholder 1"/>
+          <p:cNvSpPr>
+            <a:spLocks noGrp="1"/>
+          </p:cNvSpPr>
+          <p:nvPr>
+            <p:ph type="sldImg" idx="2"/>
+          </p:nvPr>
+        </p:nvSpPr>
+        <p:spPr/>
+      </p:sp>
+      <p:sp>
+        <p:nvSpPr>
+          <p:cNvPr id="3" name="Notes Placeholder 2"/>
+          <p:cNvSpPr>
+            <a:spLocks noGrp="1"/>
+          </p:cNvSpPr>
+          <p:nvPr>
+            <p:ph type="body" idx="3" sz="quarter"/>
+          </p:nvPr>
+        </p:nvSpPr>
+        <p:spPr/>
+        <p:txBody>
+          <a:bodyPr/>
+          <a:lstStyle/>
+          <a:p>
+            <a:r>
+              <a:t>---</a:t>
+            </a:r>
+          </a:p>
+          <a:p>
+            <a:r>
+              <a:t>🔧 This presentation was created using Ag-ppt-create</a:t>
+            </a:r>
+          </a:p>
+          <a:p>
+            <a:r>
+              <a:t>https://github.com/aktsmm/Agent-Skills/tree/main/powerpoint-automation</a:t>
+            </a:r>
+          </a:p>
+        </p:txBody>
+      </p:sp>
+      <p:sp>
+        <p:nvSpPr>
+          <p:cNvPr id="4" name="Slide Number Placeholder 3"/>
+          <p:cNvSpPr>
+            <a:spLocks noGrp="1"/>
+          </p:cNvSpPr>
+          <p:nvPr>
+            <p:ph type="sldNum" idx="5" sz="quarter"/>
+          </p:nvPr>
+        </p:nvSpPr>
+        <p:spPr/>
+      </p:sp>
+    </p:spTree>
+  </p:cSld>
+  <p:clrMapOvr>
+    <a:masterClrMapping/>
+  </p:clrMapOvr>
+</p:notes>
 </file>
 
 <file path=ppt/slideLayouts/slideLayout1.xml><?xml version="1.0" encoding="utf-8"?>
@@ -3113,13 +3613,6 @@
           <a:bodyPr/>
           <a:lstStyle/>
           <a:p>
-            <a:pPr>
-              <a:defRPr sz="3600">
-                <a:solidFill>
-                  <a:srgbClr val="0078D4"/>
-                </a:solidFill>
-              </a:defRPr>
-            </a:pPr>
             <a:r>
               <a:t>Azure Ops Dashboard</a:t>
             </a:r>
@@ -3141,25 +3634,10 @@
           <a:bodyPr/>
           <a:lstStyle/>
           <a:p>
-            <a:pPr>
-              <a:defRPr sz="1600">
-                <a:solidFill>
-                  <a:srgbClr val="333333"/>
-                </a:solidFill>
-              </a:defRPr>
-            </a:pPr>
             <a:r>
               <a:t>One-click Azure environment visualization &amp; AI-powered operational reports</a:t>
             </a:r>
-          </a:p>
-          <a:p>
-            <a:pPr>
-              <a:defRPr sz="1600">
-                <a:solidFill>
-                  <a:srgbClr val="333333"/>
-                </a:solidFill>
-              </a:defRPr>
-            </a:pPr>
+            <a:br/>
             <a:r>
               <a:t>FY26 GitHub Copilot SDK Enterprise Challenge</a:t>
             </a:r>
@@ -3199,13 +3677,6 @@
           <a:bodyPr/>
           <a:lstStyle/>
           <a:p>
-            <a:pPr>
-              <a:defRPr sz="2800">
-                <a:solidFill>
-                  <a:srgbClr val="0078D4"/>
-                </a:solidFill>
-              </a:defRPr>
-            </a:pPr>
             <a:r>
               <a:t>Key Design Decisions</a:t>
             </a:r>
@@ -3227,73 +3698,37 @@
           <a:bodyPr/>
           <a:lstStyle/>
           <a:p>
-            <a:pPr>
-              <a:defRPr sz="1400">
-                <a:solidFill>
-                  <a:srgbClr val="333333"/>
-                </a:solidFill>
-              </a:defRPr>
-            </a:pPr>
+            <a:pPr/>
             <a:r>
               <a:t>Template system: bundled defaults + user override (%APPDATA%)</a:t>
             </a:r>
           </a:p>
           <a:p>
-            <a:pPr lvl="1">
-              <a:defRPr sz="1200">
-                <a:solidFill>
-                  <a:srgbClr val="646464"/>
-                </a:solidFill>
-              </a:defRPr>
-            </a:pPr>
+            <a:pPr lvl="1"/>
             <a:r>
               <a:t>No exe rebuild needed to update report templates</a:t>
             </a:r>
           </a:p>
           <a:p>
-            <a:pPr>
-              <a:defRPr sz="1400">
-                <a:solidFill>
-                  <a:srgbClr val="333333"/>
-                </a:solidFill>
-              </a:defRPr>
-            </a:pPr>
+            <a:pPr/>
             <a:r>
               <a:t>i18n: Japanese/English runtime switching (UI + reports)</a:t>
             </a:r>
           </a:p>
           <a:p>
-            <a:pPr>
-              <a:defRPr sz="1400">
-                <a:solidFill>
-                  <a:srgbClr val="333333"/>
-                </a:solidFill>
-              </a:defRPr>
-            </a:pPr>
+            <a:pPr/>
             <a:r>
               <a:t>Read-only Azure operations only — Reader role minimum</a:t>
             </a:r>
           </a:p>
           <a:p>
-            <a:pPr>
-              <a:defRPr sz="1400">
-                <a:solidFill>
-                  <a:srgbClr val="333333"/>
-                </a:solidFill>
-              </a:defRPr>
-            </a:pPr>
+            <a:pPr/>
             <a:r>
               <a:t>No secrets stored to disk — entered per-session via GUI</a:t>
             </a:r>
           </a:p>
           <a:p>
-            <a:pPr>
-              <a:defRPr sz="1400">
-                <a:solidFill>
-                  <a:srgbClr val="333333"/>
-                </a:solidFill>
-              </a:defRPr>
-            </a:pPr>
+            <a:pPr/>
             <a:r>
               <a:t>32 unit tests runnable without Azure/SDK connectivity</a:t>
             </a:r>
@@ -3333,13 +3768,6 @@
           <a:bodyPr/>
           <a:lstStyle/>
           <a:p>
-            <a:pPr>
-              <a:defRPr sz="2800">
-                <a:solidFill>
-                  <a:srgbClr val="0078D4"/>
-                </a:solidFill>
-              </a:defRPr>
-            </a:pPr>
             <a:r>
               <a:t>Repository &amp; Links</a:t>
             </a:r>
@@ -3361,61 +3789,31 @@
           <a:bodyPr/>
           <a:lstStyle/>
           <a:p>
-            <a:pPr>
-              <a:defRPr sz="1400">
-                <a:solidFill>
-                  <a:srgbClr val="333333"/>
-                </a:solidFill>
-              </a:defRPr>
-            </a:pPr>
+            <a:pPr/>
             <a:r>
               <a:t>Repository: https://github.com/aktsmm/azure-ops-dashboard</a:t>
             </a:r>
           </a:p>
           <a:p>
-            <a:pPr>
-              <a:defRPr sz="1400">
-                <a:solidFill>
-                  <a:srgbClr val="333333"/>
-                </a:solidFill>
-              </a:defRPr>
-            </a:pPr>
+            <a:pPr/>
             <a:r>
               <a:t>License: CC-BY-NC-SA-4.0</a:t>
             </a:r>
           </a:p>
           <a:p>
-            <a:pPr>
-              <a:defRPr sz="1400">
-                <a:solidFill>
-                  <a:srgbClr val="333333"/>
-                </a:solidFill>
-              </a:defRPr>
-            </a:pPr>
+            <a:pPr/>
             <a:r>
               <a:t>Language: Python 3.11+</a:t>
             </a:r>
           </a:p>
           <a:p>
-            <a:pPr>
-              <a:defRPr sz="1400">
-                <a:solidFill>
-                  <a:srgbClr val="333333"/>
-                </a:solidFill>
-              </a:defRPr>
-            </a:pPr>
+            <a:pPr/>
             <a:r>
               <a:t>Tests: 32 tests (python -m unittest tests)</a:t>
             </a:r>
           </a:p>
           <a:p>
-            <a:pPr>
-              <a:defRPr sz="1400">
-                <a:solidFill>
-                  <a:srgbClr val="333333"/>
-                </a:solidFill>
-              </a:defRPr>
-            </a:pPr>
+            <a:pPr/>
             <a:r>
               <a:t>Docs: README.md (EN/JA), DESIGN.md, AGENTS.md, RAI notes</a:t>
             </a:r>
@@ -3450,39 +3848,20 @@
             <p:ph type="title"/>
           </p:nvPr>
         </p:nvSpPr>
-        <p:spPr/>
-        <p:txBody>
-          <a:bodyPr/>
-          <a:lstStyle/>
-          <a:p>
-            <a:pPr>
-              <a:defRPr sz="3200">
-                <a:solidFill>
-                  <a:srgbClr val="0078D4"/>
-                </a:solidFill>
-              </a:defRPr>
-            </a:pPr>
+        <p:spPr>
+          <a:xfrm>
+            <a:off x="0" y="2400300"/>
+            <a:ext cx="10820519" cy="914400"/>
+          </a:xfrm>
+        </p:spPr>
+        <p:txBody>
+          <a:bodyPr wrap="none"/>
+          <a:lstStyle/>
+          <a:p>
             <a:r>
               <a:t>Business Value Proposition</a:t>
             </a:r>
           </a:p>
-        </p:txBody>
-      </p:sp>
-      <p:sp>
-        <p:nvSpPr>
-          <p:cNvPr id="3" name="Text Placeholder 2"/>
-          <p:cNvSpPr>
-            <a:spLocks noGrp="1"/>
-          </p:cNvSpPr>
-          <p:nvPr>
-            <p:ph type="body" idx="1"/>
-          </p:nvPr>
-        </p:nvSpPr>
-        <p:spPr/>
-        <p:txBody>
-          <a:bodyPr/>
-          <a:lstStyle/>
-          <a:p/>
         </p:txBody>
       </p:sp>
     </p:spTree>
@@ -3518,13 +3897,6 @@
           <a:bodyPr/>
           <a:lstStyle/>
           <a:p>
-            <a:pPr>
-              <a:defRPr sz="2800">
-                <a:solidFill>
-                  <a:srgbClr val="0078D4"/>
-                </a:solidFill>
-              </a:defRPr>
-            </a:pPr>
             <a:r>
               <a:t>The Problem</a:t>
             </a:r>
@@ -3546,61 +3918,31 @@
           <a:bodyPr/>
           <a:lstStyle/>
           <a:p>
-            <a:pPr>
-              <a:defRPr sz="1400">
-                <a:solidFill>
-                  <a:srgbClr val="333333"/>
-                </a:solidFill>
-              </a:defRPr>
-            </a:pPr>
+            <a:pPr/>
             <a:r>
               <a:t>Enterprise IT teams manage complex Azure environments across multiple subscriptions</a:t>
             </a:r>
           </a:p>
           <a:p>
-            <a:pPr lvl="1">
-              <a:defRPr sz="1200">
-                <a:solidFill>
-                  <a:srgbClr val="646464"/>
-                </a:solidFill>
-              </a:defRPr>
-            </a:pPr>
+            <a:pPr lvl="1"/>
             <a:r>
               <a:t>Visualizing requires juggling Azure Portal, CLI, Resource Graph, and manual docs</a:t>
             </a:r>
           </a:p>
           <a:p>
-            <a:pPr>
-              <a:defRPr sz="1400">
-                <a:solidFill>
-                  <a:srgbClr val="333333"/>
-                </a:solidFill>
-              </a:defRPr>
-            </a:pPr>
+            <a:pPr/>
             <a:r>
               <a:t>Security posture and cost optimization reviews are manual and inconsistent</a:t>
             </a:r>
           </a:p>
           <a:p>
-            <a:pPr lvl="1">
-              <a:defRPr sz="1200">
-                <a:solidFill>
-                  <a:srgbClr val="646464"/>
-                </a:solidFill>
-              </a:defRPr>
-            </a:pPr>
+            <a:pPr lvl="1"/>
             <a:r>
               <a:t>No single tool provides As-Is diagrams + AI-driven operational insights</a:t>
             </a:r>
           </a:p>
           <a:p>
-            <a:pPr>
-              <a:defRPr sz="1400">
-                <a:solidFill>
-                  <a:srgbClr val="333333"/>
-                </a:solidFill>
-              </a:defRPr>
-            </a:pPr>
+            <a:pPr/>
             <a:r>
               <a:t>Documentation becomes stale — environment drift goes undetected</a:t>
             </a:r>
@@ -3640,13 +3982,6 @@
           <a:bodyPr/>
           <a:lstStyle/>
           <a:p>
-            <a:pPr>
-              <a:defRPr sz="2800">
-                <a:solidFill>
-                  <a:srgbClr val="0078D4"/>
-                </a:solidFill>
-              </a:defRPr>
-            </a:pPr>
             <a:r>
               <a:t>The Solution: Azure Ops Dashboard</a:t>
             </a:r>
@@ -3668,109 +4003,55 @@
           <a:bodyPr/>
           <a:lstStyle/>
           <a:p>
-            <a:pPr>
-              <a:defRPr sz="1400">
-                <a:solidFill>
-                  <a:srgbClr val="333333"/>
-                </a:solidFill>
-              </a:defRPr>
-            </a:pPr>
+            <a:pPr/>
             <a:r>
               <a:t>One-click data collection via Azure Resource Graph</a:t>
             </a:r>
           </a:p>
           <a:p>
-            <a:pPr lvl="1">
-              <a:defRPr sz="1200">
-                <a:solidFill>
-                  <a:srgbClr val="646464"/>
-                </a:solidFill>
-              </a:defRPr>
-            </a:pPr>
+            <a:pPr lvl="1"/>
             <a:r>
               <a:t>Inventories all resources, networking, security, cost data</a:t>
             </a:r>
           </a:p>
           <a:p>
-            <a:pPr>
-              <a:defRPr sz="1400">
-                <a:solidFill>
-                  <a:srgbClr val="333333"/>
-                </a:solidFill>
-              </a:defRPr>
-            </a:pPr>
+            <a:pPr/>
             <a:r>
               <a:t>Draw.io architecture diagrams with Azure-official icons</a:t>
             </a:r>
           </a:p>
           <a:p>
-            <a:pPr lvl="1">
-              <a:defRPr sz="1200">
-                <a:solidFill>
-                  <a:srgbClr val="646464"/>
-                </a:solidFill>
-              </a:defRPr>
-            </a:pPr>
+            <a:pPr lvl="1"/>
             <a:r>
               <a:t>Inventory view + Network topology (VNet/Subnet hierarchy)</a:t>
             </a:r>
           </a:p>
           <a:p>
-            <a:pPr>
-              <a:defRPr sz="1400">
-                <a:solidFill>
-                  <a:srgbClr val="333333"/>
-                </a:solidFill>
-              </a:defRPr>
-            </a:pPr>
+            <a:pPr/>
             <a:r>
               <a:t>AI-powered reports via GitHub Copilot SDK</a:t>
             </a:r>
           </a:p>
           <a:p>
-            <a:pPr lvl="1">
-              <a:defRPr sz="1200">
-                <a:solidFill>
-                  <a:srgbClr val="646464"/>
-                </a:solidFill>
-              </a:defRPr>
-            </a:pPr>
+            <a:pPr lvl="1"/>
             <a:r>
               <a:t>Security: Secure Score, Defender, recommendations</a:t>
             </a:r>
           </a:p>
           <a:p>
-            <a:pPr lvl="1">
-              <a:defRPr sz="1200">
-                <a:solidFill>
-                  <a:srgbClr val="646464"/>
-                </a:solidFill>
-              </a:defRPr>
-            </a:pPr>
+            <a:pPr lvl="1"/>
             <a:r>
               <a:t>Cost: spend breakdown, optimization, Advisor integration</a:t>
             </a:r>
           </a:p>
           <a:p>
-            <a:pPr>
-              <a:defRPr sz="1400">
-                <a:solidFill>
-                  <a:srgbClr val="333333"/>
-                </a:solidFill>
-              </a:defRPr>
-            </a:pPr>
+            <a:pPr/>
             <a:r>
               <a:t>Diff reports: automatic comparison with previous runs</a:t>
             </a:r>
           </a:p>
           <a:p>
-            <a:pPr>
-              <a:defRPr sz="1400">
-                <a:solidFill>
-                  <a:srgbClr val="333333"/>
-                </a:solidFill>
-              </a:defRPr>
-            </a:pPr>
+            <a:pPr/>
             <a:r>
               <a:t>Desktop GUI (tkinter) — no cloud deployment required</a:t>
             </a:r>
@@ -3810,13 +4091,6 @@
           <a:bodyPr/>
           <a:lstStyle/>
           <a:p>
-            <a:pPr>
-              <a:defRPr sz="2800">
-                <a:solidFill>
-                  <a:srgbClr val="0078D4"/>
-                </a:solidFill>
-              </a:defRPr>
-            </a:pPr>
             <a:r>
               <a:t>Business Value</a:t>
             </a:r>
@@ -3838,73 +4112,37 @@
           <a:bodyPr/>
           <a:lstStyle/>
           <a:p>
-            <a:pPr>
-              <a:defRPr sz="1400">
-                <a:solidFill>
-                  <a:srgbClr val="333333"/>
-                </a:solidFill>
-              </a:defRPr>
-            </a:pPr>
+            <a:pPr/>
             <a:r>
               <a:t>Time savings: Environment visualization in minutes, not hours</a:t>
             </a:r>
           </a:p>
           <a:p>
-            <a:pPr>
-              <a:defRPr sz="1400">
-                <a:solidFill>
-                  <a:srgbClr val="333333"/>
-                </a:solidFill>
-              </a:defRPr>
-            </a:pPr>
+            <a:pPr/>
             <a:r>
               <a:t>Security: Early detection of misconfigurations and risks</a:t>
             </a:r>
           </a:p>
           <a:p>
-            <a:pPr>
-              <a:defRPr sz="1400">
-                <a:solidFill>
-                  <a:srgbClr val="333333"/>
-                </a:solidFill>
-              </a:defRPr>
-            </a:pPr>
+            <a:pPr/>
             <a:r>
               <a:t>Cost optimization: AI-driven spend analysis and recommendations</a:t>
             </a:r>
           </a:p>
           <a:p>
-            <a:pPr>
-              <a:defRPr sz="1400">
-                <a:solidFill>
-                  <a:srgbClr val="333333"/>
-                </a:solidFill>
-              </a:defRPr>
-            </a:pPr>
+            <a:pPr/>
             <a:r>
               <a:t>Drift tracking: Automated diff reports across time</a:t>
             </a:r>
           </a:p>
           <a:p>
-            <a:pPr>
-              <a:defRPr sz="1400">
-                <a:solidFill>
-                  <a:srgbClr val="333333"/>
-                </a:solidFill>
-              </a:defRPr>
-            </a:pPr>
+            <a:pPr/>
             <a:r>
               <a:t>Reusability: Template system for customized reports per customer</a:t>
             </a:r>
           </a:p>
           <a:p>
-            <a:pPr>
-              <a:defRPr sz="1400">
-                <a:solidFill>
-                  <a:srgbClr val="333333"/>
-                </a:solidFill>
-              </a:defRPr>
-            </a:pPr>
+            <a:pPr/>
             <a:r>
               <a:t>Amplification: Applicable to any Azure enterprise engagement</a:t>
             </a:r>
@@ -3939,39 +4177,20 @@
             <p:ph type="title"/>
           </p:nvPr>
         </p:nvSpPr>
-        <p:spPr/>
-        <p:txBody>
-          <a:bodyPr/>
-          <a:lstStyle/>
-          <a:p>
-            <a:pPr>
-              <a:defRPr sz="3200">
-                <a:solidFill>
-                  <a:srgbClr val="0078D4"/>
-                </a:solidFill>
-              </a:defRPr>
-            </a:pPr>
+        <p:spPr>
+          <a:xfrm>
+            <a:off x="0" y="2400300"/>
+            <a:ext cx="10820519" cy="914400"/>
+          </a:xfrm>
+        </p:spPr>
+        <p:txBody>
+          <a:bodyPr wrap="none"/>
+          <a:lstStyle/>
+          <a:p>
             <a:r>
               <a:t>Architecture &amp; Technical Highlights</a:t>
             </a:r>
           </a:p>
-        </p:txBody>
-      </p:sp>
-      <p:sp>
-        <p:nvSpPr>
-          <p:cNvPr id="3" name="Text Placeholder 2"/>
-          <p:cNvSpPr>
-            <a:spLocks noGrp="1"/>
-          </p:cNvSpPr>
-          <p:nvPr>
-            <p:ph type="body" idx="1"/>
-          </p:nvPr>
-        </p:nvSpPr>
-        <p:spPr/>
-        <p:txBody>
-          <a:bodyPr/>
-          <a:lstStyle/>
-          <a:p/>
         </p:txBody>
       </p:sp>
     </p:spTree>
@@ -4007,13 +4226,6 @@
           <a:bodyPr/>
           <a:lstStyle/>
           <a:p>
-            <a:pPr>
-              <a:defRPr sz="2800">
-                <a:solidFill>
-                  <a:srgbClr val="0078D4"/>
-                </a:solidFill>
-              </a:defRPr>
-            </a:pPr>
             <a:r>
               <a:t>Architecture Overview</a:t>
             </a:r>
@@ -4035,73 +4247,37 @@
           <a:bodyPr/>
           <a:lstStyle/>
           <a:p>
-            <a:pPr>
-              <a:defRPr sz="1400">
-                <a:solidFill>
-                  <a:srgbClr val="333333"/>
-                </a:solidFill>
-              </a:defRPr>
-            </a:pPr>
+            <a:pPr/>
             <a:r>
               <a:t>Desktop GUI (tkinter) with threaded background workers</a:t>
             </a:r>
           </a:p>
           <a:p>
-            <a:pPr>
-              <a:defRPr sz="1400">
-                <a:solidFill>
-                  <a:srgbClr val="333333"/>
-                </a:solidFill>
-              </a:defRPr>
-            </a:pPr>
+            <a:pPr/>
             <a:r>
               <a:t>Data Collection: Azure CLI / Resource Graph / Security Center / Cost Mgmt / Advisor</a:t>
             </a:r>
           </a:p>
           <a:p>
-            <a:pPr>
-              <a:defRPr sz="1400">
-                <a:solidFill>
-                  <a:srgbClr val="333333"/>
-                </a:solidFill>
-              </a:defRPr>
-            </a:pPr>
+            <a:pPr/>
             <a:r>
               <a:t>AI Engine: GitHub Copilot SDK (CopilotClient streaming sessions)</a:t>
             </a:r>
           </a:p>
           <a:p>
-            <a:pPr lvl="1">
-              <a:defRPr sz="1200">
-                <a:solidFill>
-                  <a:srgbClr val="646464"/>
-                </a:solidFill>
-              </a:defRPr>
-            </a:pPr>
+            <a:pPr lvl="1"/>
             <a:r>
               <a:t>Enrichment: Microsoft Learn Search API + MCP server</a:t>
             </a:r>
           </a:p>
           <a:p>
-            <a:pPr>
-              <a:defRPr sz="1400">
-                <a:solidFill>
-                  <a:srgbClr val="333333"/>
-                </a:solidFill>
-              </a:defRPr>
-            </a:pPr>
+            <a:pPr/>
             <a:r>
               <a:t>Output: Draw.io XML / Markdown / Word / PDF / diff reports</a:t>
             </a:r>
           </a:p>
           <a:p>
-            <a:pPr>
-              <a:defRPr sz="1400">
-                <a:solidFill>
-                  <a:srgbClr val="333333"/>
-                </a:solidFill>
-              </a:defRPr>
-            </a:pPr>
+            <a:pPr/>
             <a:r>
               <a:t>Packaging: PyInstaller single-exe distribution</a:t>
             </a:r>
@@ -4141,13 +4317,6 @@
           <a:bodyPr/>
           <a:lstStyle/>
           <a:p>
-            <a:pPr>
-              <a:defRPr sz="2800">
-                <a:solidFill>
-                  <a:srgbClr val="0078D4"/>
-                </a:solidFill>
-              </a:defRPr>
-            </a:pPr>
             <a:r>
               <a:t>GitHub Copilot SDK Integration</a:t>
             </a:r>
@@ -4169,73 +4338,37 @@
           <a:bodyPr/>
           <a:lstStyle/>
           <a:p>
-            <a:pPr>
-              <a:defRPr sz="1400">
-                <a:solidFill>
-                  <a:srgbClr val="333333"/>
-                </a:solidFill>
-              </a:defRPr>
-            </a:pPr>
+            <a:pPr/>
             <a:r>
               <a:t>CopilotClient with streaming token callbacks</a:t>
             </a:r>
           </a:p>
           <a:p>
-            <a:pPr lvl="1">
-              <a:defRPr sz="1200">
-                <a:solidFill>
-                  <a:srgbClr val="646464"/>
-                </a:solidFill>
-              </a:defRPr>
-            </a:pPr>
+            <a:pPr lvl="1"/>
             <a:r>
               <a:t>Dynamic model selection: claude-sonnet (latest) / gpt-4.1 fallback</a:t>
             </a:r>
           </a:p>
           <a:p>
-            <a:pPr>
-              <a:defRPr sz="1400">
-                <a:solidFill>
-                  <a:srgbClr val="333333"/>
-                </a:solidFill>
-              </a:defRPr>
-            </a:pPr>
+            <a:pPr/>
             <a:r>
               <a:t>Read-only tool permissions (no write operations)</a:t>
             </a:r>
           </a:p>
           <a:p>
-            <a:pPr>
-              <a:defRPr sz="1400">
-                <a:solidFill>
-                  <a:srgbClr val="333333"/>
-                </a:solidFill>
-              </a:defRPr>
-            </a:pPr>
+            <a:pPr/>
             <a:r>
               <a:t>Microsoft Docs MCP for document-grounded analysis</a:t>
             </a:r>
           </a:p>
           <a:p>
-            <a:pPr>
-              <a:defRPr sz="1400">
-                <a:solidFill>
-                  <a:srgbClr val="333333"/>
-                </a:solidFill>
-              </a:defRPr>
-            </a:pPr>
+            <a:pPr/>
             <a:r>
               <a:t>Retry with exponential backoff + future.cancel() on timeout</a:t>
             </a:r>
           </a:p>
           <a:p>
-            <a:pPr>
-              <a:defRPr sz="1400">
-                <a:solidFill>
-                  <a:srgbClr val="333333"/>
-                </a:solidFill>
-              </a:defRPr>
-            </a:pPr>
+            <a:pPr/>
             <a:r>
               <a:t>Thread-safe streaming UI: atomic buffer swap at 100ms</a:t>
             </a:r>
@@ -4275,13 +4408,6 @@
           <a:bodyPr/>
           <a:lstStyle/>
           <a:p>
-            <a:pPr>
-              <a:defRPr sz="2800">
-                <a:solidFill>
-                  <a:srgbClr val="0078D4"/>
-                </a:solidFill>
-              </a:defRPr>
-            </a:pPr>
             <a:r>
               <a:t>Azure Integration Points</a:t>
             </a:r>
@@ -4303,73 +4429,37 @@
           <a:bodyPr/>
           <a:lstStyle/>
           <a:p>
-            <a:pPr>
-              <a:defRPr sz="1400">
-                <a:solidFill>
-                  <a:srgbClr val="333333"/>
-                </a:solidFill>
-              </a:defRPr>
-            </a:pPr>
+            <a:pPr/>
             <a:r>
               <a:t>Azure Resource Graph — full inventory across subscriptions</a:t>
             </a:r>
           </a:p>
           <a:p>
-            <a:pPr>
-              <a:defRPr sz="1400">
-                <a:solidFill>
-                  <a:srgbClr val="333333"/>
-                </a:solidFill>
-              </a:defRPr>
-            </a:pPr>
+            <a:pPr/>
             <a:r>
               <a:t>Microsoft Defender for Cloud — Secure Score, alerts, recommendations</a:t>
             </a:r>
           </a:p>
           <a:p>
-            <a:pPr>
-              <a:defRPr sz="1400">
-                <a:solidFill>
-                  <a:srgbClr val="333333"/>
-                </a:solidFill>
-              </a:defRPr>
-            </a:pPr>
+            <a:pPr/>
             <a:r>
               <a:t>Azure Cost Management — spend by service/resource group</a:t>
             </a:r>
           </a:p>
           <a:p>
-            <a:pPr>
-              <a:defRPr sz="1400">
-                <a:solidFill>
-                  <a:srgbClr val="333333"/>
-                </a:solidFill>
-              </a:defRPr>
-            </a:pPr>
+            <a:pPr/>
             <a:r>
               <a:t>Azure Advisor — optimization recommendations</a:t>
             </a:r>
           </a:p>
           <a:p>
-            <a:pPr>
-              <a:defRPr sz="1400">
-                <a:solidFill>
-                  <a:srgbClr val="333333"/>
-                </a:solidFill>
-              </a:defRPr>
-            </a:pPr>
+            <a:pPr/>
             <a:r>
               <a:t>Microsoft Learn Search API — enrichment for AI reports</a:t>
             </a:r>
           </a:p>
           <a:p>
-            <a:pPr>
-              <a:defRPr sz="1400">
-                <a:solidFill>
-                  <a:srgbClr val="333333"/>
-                </a:solidFill>
-              </a:defRPr>
-            </a:pPr>
+            <a:pPr/>
             <a:r>
               <a:t>Service Principal + Interactive login support</a:t>
             </a:r>
@@ -4702,4 +4792,324 @@
   </a:objectDefaults>
   <a:extraClrSchemeLst/>
 </a:theme>
+</file>
+
+<file path=ppt/theme/theme2.xml><?xml version="1.0" encoding="utf-8"?>
+<a:theme xmlns:a="http://schemas.openxmlformats.org/drawingml/2006/main" name="Office Theme">
+  <a:themeElements>
+    <a:clrScheme name="Office">
+      <a:dk1>
+        <a:sysClr val="windowText" lastClr="000000"/>
+      </a:dk1>
+      <a:lt1>
+        <a:sysClr val="window" lastClr="FFFFFF"/>
+      </a:lt1>
+      <a:dk2>
+        <a:srgbClr val="1F497D"/>
+      </a:dk2>
+      <a:lt2>
+        <a:srgbClr val="EEECE1"/>
+      </a:lt2>
+      <a:accent1>
+        <a:srgbClr val="4F81BD"/>
+      </a:accent1>
+      <a:accent2>
+        <a:srgbClr val="C0504D"/>
+      </a:accent2>
+      <a:accent3>
+        <a:srgbClr val="9BBB59"/>
+      </a:accent3>
+      <a:accent4>
+        <a:srgbClr val="8064A2"/>
+      </a:accent4>
+      <a:accent5>
+        <a:srgbClr val="4BACC6"/>
+      </a:accent5>
+      <a:accent6>
+        <a:srgbClr val="F79646"/>
+      </a:accent6>
+      <a:hlink>
+        <a:srgbClr val="0000FF"/>
+      </a:hlink>
+      <a:folHlink>
+        <a:srgbClr val="800080"/>
+      </a:folHlink>
+    </a:clrScheme>
+    <a:fontScheme name="Office">
+      <a:majorFont>
+        <a:latin typeface="Calibri"/>
+        <a:ea typeface=""/>
+        <a:cs typeface=""/>
+        <a:font script="Jpan" typeface="ＭＳ Ｐゴシック"/>
+        <a:font script="Hang" typeface="맑은 고딕"/>
+        <a:font script="Hans" typeface="宋体"/>
+        <a:font script="Hant" typeface="新細明體"/>
+        <a:font script="Arab" typeface="Times New Roman"/>
+        <a:font script="Hebr" typeface="Times New Roman"/>
+        <a:font script="Thai" typeface="Angsana New"/>
+        <a:font script="Ethi" typeface="Nyala"/>
+        <a:font script="Beng" typeface="Vrinda"/>
+        <a:font script="Gujr" typeface="Shruti"/>
+        <a:font script="Khmr" typeface="MoolBoran"/>
+        <a:font script="Knda" typeface="Tunga"/>
+        <a:font script="Guru" typeface="Raavi"/>
+        <a:font script="Cans" typeface="Euphemia"/>
+        <a:font script="Cher" typeface="Plantagenet Cherokee"/>
+        <a:font script="Yiii" typeface="Microsoft Yi Baiti"/>
+        <a:font script="Tibt" typeface="Microsoft Himalaya"/>
+        <a:font script="Thaa" typeface="MV Boli"/>
+        <a:font script="Deva" typeface="Mangal"/>
+        <a:font script="Telu" typeface="Gautami"/>
+        <a:font script="Taml" typeface="Latha"/>
+        <a:font script="Syrc" typeface="Estrangelo Edessa"/>
+        <a:font script="Orya" typeface="Kalinga"/>
+        <a:font script="Mlym" typeface="Kartika"/>
+        <a:font script="Laoo" typeface="DokChampa"/>
+        <a:font script="Sinh" typeface="Iskoola Pota"/>
+        <a:font script="Mong" typeface="Mongolian Baiti"/>
+        <a:font script="Viet" typeface="Times New Roman"/>
+        <a:font script="Uigh" typeface="Microsoft Uighur"/>
+        <a:font script="Geor" typeface="Sylfaen"/>
+      </a:majorFont>
+      <a:minorFont>
+        <a:latin typeface="Calibri"/>
+        <a:ea typeface=""/>
+        <a:cs typeface=""/>
+        <a:font script="Jpan" typeface="ＭＳ Ｐゴシック"/>
+        <a:font script="Hang" typeface="맑은 고딕"/>
+        <a:font script="Hans" typeface="宋体"/>
+        <a:font script="Hant" typeface="新細明體"/>
+        <a:font script="Arab" typeface="Arial"/>
+        <a:font script="Hebr" typeface="Arial"/>
+        <a:font script="Thai" typeface="Cordia New"/>
+        <a:font script="Ethi" typeface="Nyala"/>
+        <a:font script="Beng" typeface="Vrinda"/>
+        <a:font script="Gujr" typeface="Shruti"/>
+        <a:font script="Khmr" typeface="DaunPenh"/>
+        <a:font script="Knda" typeface="Tunga"/>
+        <a:font script="Guru" typeface="Raavi"/>
+        <a:font script="Cans" typeface="Euphemia"/>
+        <a:font script="Cher" typeface="Plantagenet Cherokee"/>
+        <a:font script="Yiii" typeface="Microsoft Yi Baiti"/>
+        <a:font script="Tibt" typeface="Microsoft Himalaya"/>
+        <a:font script="Thaa" typeface="MV Boli"/>
+        <a:font script="Deva" typeface="Mangal"/>
+        <a:font script="Telu" typeface="Gautami"/>
+        <a:font script="Taml" typeface="Latha"/>
+        <a:font script="Syrc" typeface="Estrangelo Edessa"/>
+        <a:font script="Orya" typeface="Kalinga"/>
+        <a:font script="Mlym" typeface="Kartika"/>
+        <a:font script="Laoo" typeface="DokChampa"/>
+        <a:font script="Sinh" typeface="Iskoola Pota"/>
+        <a:font script="Mong" typeface="Mongolian Baiti"/>
+        <a:font script="Viet" typeface="Arial"/>
+        <a:font script="Uigh" typeface="Microsoft Uighur"/>
+        <a:font script="Geor" typeface="Sylfaen"/>
+      </a:minorFont>
+    </a:fontScheme>
+    <a:fmtScheme name="Office">
+      <a:fillStyleLst>
+        <a:solidFill>
+          <a:schemeClr val="phClr"/>
+        </a:solidFill>
+        <a:gradFill rotWithShape="1">
+          <a:gsLst>
+            <a:gs pos="0">
+              <a:schemeClr val="phClr">
+                <a:tint val="50000"/>
+                <a:satMod val="300000"/>
+              </a:schemeClr>
+            </a:gs>
+            <a:gs pos="35000">
+              <a:schemeClr val="phClr">
+                <a:tint val="37000"/>
+                <a:satMod val="300000"/>
+              </a:schemeClr>
+            </a:gs>
+            <a:gs pos="100000">
+              <a:schemeClr val="phClr">
+                <a:tint val="15000"/>
+                <a:satMod val="350000"/>
+              </a:schemeClr>
+            </a:gs>
+          </a:gsLst>
+          <a:lin ang="16200000" scaled="1"/>
+        </a:gradFill>
+        <a:gradFill rotWithShape="1">
+          <a:gsLst>
+            <a:gs pos="0">
+              <a:schemeClr val="phClr">
+                <a:tint val="100000"/>
+                <a:shade val="100000"/>
+                <a:satMod val="130000"/>
+              </a:schemeClr>
+            </a:gs>
+            <a:gs pos="100000">
+              <a:schemeClr val="phClr">
+                <a:tint val="50000"/>
+                <a:shade val="100000"/>
+                <a:satMod val="350000"/>
+              </a:schemeClr>
+            </a:gs>
+          </a:gsLst>
+          <a:lin ang="16200000" scaled="0"/>
+        </a:gradFill>
+      </a:fillStyleLst>
+      <a:lnStyleLst>
+        <a:ln w="9525" cap="flat" cmpd="sng" algn="ctr">
+          <a:solidFill>
+            <a:schemeClr val="phClr">
+              <a:shade val="95000"/>
+              <a:satMod val="105000"/>
+            </a:schemeClr>
+          </a:solidFill>
+          <a:prstDash val="solid"/>
+        </a:ln>
+        <a:ln w="25400" cap="flat" cmpd="sng" algn="ctr">
+          <a:solidFill>
+            <a:schemeClr val="phClr"/>
+          </a:solidFill>
+          <a:prstDash val="solid"/>
+        </a:ln>
+        <a:ln w="38100" cap="flat" cmpd="sng" algn="ctr">
+          <a:solidFill>
+            <a:schemeClr val="phClr"/>
+          </a:solidFill>
+          <a:prstDash val="solid"/>
+        </a:ln>
+      </a:lnStyleLst>
+      <a:effectStyleLst>
+        <a:effectStyle>
+          <a:effectLst>
+            <a:outerShdw blurRad="40000" dist="20000" dir="5400000" rotWithShape="0">
+              <a:srgbClr val="000000">
+                <a:alpha val="38000"/>
+              </a:srgbClr>
+            </a:outerShdw>
+          </a:effectLst>
+        </a:effectStyle>
+        <a:effectStyle>
+          <a:effectLst>
+            <a:outerShdw blurRad="40000" dist="23000" dir="5400000" rotWithShape="0">
+              <a:srgbClr val="000000">
+                <a:alpha val="35000"/>
+              </a:srgbClr>
+            </a:outerShdw>
+          </a:effectLst>
+        </a:effectStyle>
+        <a:effectStyle>
+          <a:effectLst>
+            <a:outerShdw blurRad="40000" dist="23000" dir="5400000" rotWithShape="0">
+              <a:srgbClr val="000000">
+                <a:alpha val="35000"/>
+              </a:srgbClr>
+            </a:outerShdw>
+          </a:effectLst>
+          <a:scene3d>
+            <a:camera prst="orthographicFront">
+              <a:rot lat="0" lon="0" rev="0"/>
+            </a:camera>
+            <a:lightRig rig="threePt" dir="t">
+              <a:rot lat="0" lon="0" rev="1200000"/>
+            </a:lightRig>
+          </a:scene3d>
+          <a:sp3d>
+            <a:bevelT w="63500" h="25400"/>
+          </a:sp3d>
+        </a:effectStyle>
+      </a:effectStyleLst>
+      <a:bgFillStyleLst>
+        <a:solidFill>
+          <a:schemeClr val="phClr"/>
+        </a:solidFill>
+        <a:gradFill rotWithShape="1">
+          <a:gsLst>
+            <a:gs pos="0">
+              <a:schemeClr val="phClr">
+                <a:tint val="40000"/>
+                <a:satMod val="350000"/>
+              </a:schemeClr>
+            </a:gs>
+            <a:gs pos="40000">
+              <a:schemeClr val="phClr">
+                <a:tint val="45000"/>
+                <a:shade val="99000"/>
+                <a:satMod val="350000"/>
+              </a:schemeClr>
+            </a:gs>
+            <a:gs pos="100000">
+              <a:schemeClr val="phClr">
+                <a:shade val="20000"/>
+                <a:satMod val="255000"/>
+              </a:schemeClr>
+            </a:gs>
+          </a:gsLst>
+          <a:path path="circle">
+            <a:fillToRect l="50000" t="-80000" r="50000" b="180000"/>
+          </a:path>
+        </a:gradFill>
+        <a:gradFill rotWithShape="1">
+          <a:gsLst>
+            <a:gs pos="0">
+              <a:schemeClr val="phClr">
+                <a:tint val="80000"/>
+                <a:satMod val="300000"/>
+              </a:schemeClr>
+            </a:gs>
+            <a:gs pos="100000">
+              <a:schemeClr val="phClr">
+                <a:shade val="30000"/>
+                <a:satMod val="200000"/>
+              </a:schemeClr>
+            </a:gs>
+          </a:gsLst>
+          <a:path path="circle">
+            <a:fillToRect l="50000" t="50000" r="50000" b="50000"/>
+          </a:path>
+        </a:gradFill>
+      </a:bgFillStyleLst>
+    </a:fmtScheme>
+  </a:themeElements>
+  <a:objectDefaults>
+    <a:spDef>
+      <a:spPr/>
+      <a:bodyPr/>
+      <a:lstStyle/>
+      <a:style>
+        <a:lnRef idx="1">
+          <a:schemeClr val="accent1"/>
+        </a:lnRef>
+        <a:fillRef idx="3">
+          <a:schemeClr val="accent1"/>
+        </a:fillRef>
+        <a:effectRef idx="2">
+          <a:schemeClr val="accent1"/>
+        </a:effectRef>
+        <a:fontRef idx="minor">
+          <a:schemeClr val="lt1"/>
+        </a:fontRef>
+      </a:style>
+    </a:spDef>
+    <a:lnDef>
+      <a:spPr/>
+      <a:bodyPr/>
+      <a:lstStyle/>
+      <a:style>
+        <a:lnRef idx="2">
+          <a:schemeClr val="accent1"/>
+        </a:lnRef>
+        <a:fillRef idx="0">
+          <a:schemeClr val="accent1"/>
+        </a:fillRef>
+        <a:effectRef idx="1">
+          <a:schemeClr val="accent1"/>
+        </a:effectRef>
+        <a:fontRef idx="minor">
+          <a:schemeClr val="tx1"/>
+        </a:fontRef>
+      </a:style>
+    </a:lnDef>
+  </a:objectDefaults>
+  <a:extraClrSchemeLst/>
+</a:theme>
 </file>
</xml_diff>

<commit_message>
docs: PPTX v4 — 28pt font, full info restored, 21 slides with screenshot placeholders
</commit_message>
<xml_diff>
--- a/azure-ops-dashboard/presentations/AzureOpsDashboard.pptx
+++ b/azure-ops-dashboard/presentations/AzureOpsDashboard.pptx
@@ -16,6 +16,16 @@
     <p:sldId id="264" r:id="rId15"/>
     <p:sldId id="265" r:id="rId16"/>
     <p:sldId id="266" r:id="rId17"/>
+    <p:sldId id="267" r:id="rId18"/>
+    <p:sldId id="268" r:id="rId19"/>
+    <p:sldId id="269" r:id="rId20"/>
+    <p:sldId id="270" r:id="rId21"/>
+    <p:sldId id="271" r:id="rId22"/>
+    <p:sldId id="272" r:id="rId23"/>
+    <p:sldId id="273" r:id="rId24"/>
+    <p:sldId id="274" r:id="rId25"/>
+    <p:sldId id="275" r:id="rId26"/>
+    <p:sldId id="276" r:id="rId27"/>
   </p:sldIdLst>
   <p:sldSz cx="12192119" cy="6858000" type="screen4x3"/>
   <p:notesSz cx="6858000" cy="9144000"/>
@@ -115,506 +125,6 @@
     </a:lvl9pPr>
   </p:defaultTextStyle>
 </p:presentation>
-</file>
-
-<file path=ppt/notesMasters/notesMaster1.xml><?xml version="1.0" encoding="utf-8"?>
-<p:notesMaster xmlns:a="http://schemas.openxmlformats.org/drawingml/2006/main" xmlns:p="http://schemas.openxmlformats.org/presentationml/2006/main" xmlns:r="http://schemas.openxmlformats.org/officeDocument/2006/relationships">
-  <p:cSld>
-    <p:bg>
-      <p:bgRef idx="1001">
-        <a:schemeClr val="bg1"/>
-      </p:bgRef>
-    </p:bg>
-    <p:spTree>
-      <p:nvGrpSpPr>
-        <p:cNvPr id="1" name=""/>
-        <p:cNvGrpSpPr/>
-        <p:nvPr/>
-      </p:nvGrpSpPr>
-      <p:grpSpPr>
-        <a:xfrm>
-          <a:off x="0" y="0"/>
-          <a:ext cx="0" cy="0"/>
-          <a:chOff x="0" y="0"/>
-          <a:chExt cx="0" cy="0"/>
-        </a:xfrm>
-      </p:grpSpPr>
-      <p:sp>
-        <p:nvSpPr>
-          <p:cNvPr id="2" name="Header Placeholder 1"/>
-          <p:cNvSpPr>
-            <a:spLocks noGrp="1"/>
-          </p:cNvSpPr>
-          <p:nvPr>
-            <p:ph type="hdr" sz="quarter"/>
-          </p:nvPr>
-        </p:nvSpPr>
-        <p:spPr>
-          <a:xfrm>
-            <a:off x="0" y="0"/>
-            <a:ext cx="2971800" cy="457200"/>
-          </a:xfrm>
-          <a:prstGeom prst="rect">
-            <a:avLst/>
-          </a:prstGeom>
-        </p:spPr>
-        <p:txBody>
-          <a:bodyPr vert="horz" lIns="91440" tIns="45720" rIns="91440" bIns="45720" rtlCol="0"/>
-          <a:lstStyle>
-            <a:lvl1pPr algn="l">
-              <a:defRPr sz="1200"/>
-            </a:lvl1pPr>
-          </a:lstStyle>
-          <a:p>
-            <a:endParaRPr lang="en-US"/>
-          </a:p>
-        </p:txBody>
-      </p:sp>
-      <p:sp>
-        <p:nvSpPr>
-          <p:cNvPr id="3" name="Date Placeholder 2"/>
-          <p:cNvSpPr>
-            <a:spLocks noGrp="1"/>
-          </p:cNvSpPr>
-          <p:nvPr>
-            <p:ph type="dt" idx="1"/>
-          </p:nvPr>
-        </p:nvSpPr>
-        <p:spPr>
-          <a:xfrm>
-            <a:off x="3884613" y="0"/>
-            <a:ext cx="2971800" cy="457200"/>
-          </a:xfrm>
-          <a:prstGeom prst="rect">
-            <a:avLst/>
-          </a:prstGeom>
-        </p:spPr>
-        <p:txBody>
-          <a:bodyPr vert="horz" lIns="91440" tIns="45720" rIns="91440" bIns="45720" rtlCol="0"/>
-          <a:lstStyle>
-            <a:lvl1pPr algn="r">
-              <a:defRPr sz="1200"/>
-            </a:lvl1pPr>
-          </a:lstStyle>
-          <a:p>
-            <a:fld id="{0F89C1C7-3DCD-1040-A9CF-14679D8B5DDD}" type="datetimeFigureOut">
-              <a:rPr lang="en-US" smtClean="0"/>
-              <a:t>10/17/16</a:t>
-            </a:fld>
-            <a:endParaRPr lang="en-US"/>
-          </a:p>
-        </p:txBody>
-      </p:sp>
-      <p:sp>
-        <p:nvSpPr>
-          <p:cNvPr id="4" name="Slide Image Placeholder 3"/>
-          <p:cNvSpPr>
-            <a:spLocks noGrp="1" noRot="1" noChangeAspect="1"/>
-          </p:cNvSpPr>
-          <p:nvPr>
-            <p:ph type="sldImg" idx="2"/>
-          </p:nvPr>
-        </p:nvSpPr>
-        <p:spPr>
-          <a:xfrm>
-            <a:off x="1143000" y="685800"/>
-            <a:ext cx="4572000" cy="3429000"/>
-          </a:xfrm>
-          <a:prstGeom prst="rect">
-            <a:avLst/>
-          </a:prstGeom>
-          <a:noFill/>
-          <a:ln w="12700">
-            <a:solidFill>
-              <a:prstClr val="black"/>
-            </a:solidFill>
-          </a:ln>
-        </p:spPr>
-        <p:txBody>
-          <a:bodyPr vert="horz" lIns="91440" tIns="45720" rIns="91440" bIns="45720" rtlCol="0" anchor="ctr"/>
-          <a:lstStyle/>
-          <a:p>
-            <a:endParaRPr lang="en-US"/>
-          </a:p>
-        </p:txBody>
-      </p:sp>
-      <p:sp>
-        <p:nvSpPr>
-          <p:cNvPr id="5" name="Notes Placeholder 4"/>
-          <p:cNvSpPr>
-            <a:spLocks noGrp="1"/>
-          </p:cNvSpPr>
-          <p:nvPr>
-            <p:ph type="body" sz="quarter" idx="3"/>
-          </p:nvPr>
-        </p:nvSpPr>
-        <p:spPr>
-          <a:xfrm>
-            <a:off x="685800" y="4343400"/>
-            <a:ext cx="5486400" cy="4114800"/>
-          </a:xfrm>
-          <a:prstGeom prst="rect">
-            <a:avLst/>
-          </a:prstGeom>
-        </p:spPr>
-        <p:txBody>
-          <a:bodyPr vert="horz" lIns="91440" tIns="45720" rIns="91440" bIns="45720" rtlCol="0"/>
-          <a:lstStyle/>
-          <a:p>
-            <a:pPr lvl="0"/>
-            <a:r>
-              <a:rPr lang="en-US" smtClean="0"/>
-              <a:t>Click to edit Master text styles</a:t>
-            </a:r>
-          </a:p>
-          <a:p>
-            <a:pPr lvl="1"/>
-            <a:r>
-              <a:rPr lang="en-US" smtClean="0"/>
-              <a:t>Second level</a:t>
-            </a:r>
-          </a:p>
-          <a:p>
-            <a:pPr lvl="2"/>
-            <a:r>
-              <a:rPr lang="en-US" smtClean="0"/>
-              <a:t>Third level</a:t>
-            </a:r>
-          </a:p>
-          <a:p>
-            <a:pPr lvl="3"/>
-            <a:r>
-              <a:rPr lang="en-US" smtClean="0"/>
-              <a:t>Fourth level</a:t>
-            </a:r>
-          </a:p>
-          <a:p>
-            <a:pPr lvl="4"/>
-            <a:r>
-              <a:rPr lang="en-US" smtClean="0"/>
-              <a:t>Fifth level</a:t>
-            </a:r>
-            <a:endParaRPr lang="en-US"/>
-          </a:p>
-        </p:txBody>
-      </p:sp>
-      <p:sp>
-        <p:nvSpPr>
-          <p:cNvPr id="6" name="Footer Placeholder 5"/>
-          <p:cNvSpPr>
-            <a:spLocks noGrp="1"/>
-          </p:cNvSpPr>
-          <p:nvPr>
-            <p:ph type="ftr" sz="quarter" idx="4"/>
-          </p:nvPr>
-        </p:nvSpPr>
-        <p:spPr>
-          <a:xfrm>
-            <a:off x="0" y="8685213"/>
-            <a:ext cx="2971800" cy="457200"/>
-          </a:xfrm>
-          <a:prstGeom prst="rect">
-            <a:avLst/>
-          </a:prstGeom>
-        </p:spPr>
-        <p:txBody>
-          <a:bodyPr vert="horz" lIns="91440" tIns="45720" rIns="91440" bIns="45720" rtlCol="0" anchor="b"/>
-          <a:lstStyle>
-            <a:lvl1pPr algn="l">
-              <a:defRPr sz="1200"/>
-            </a:lvl1pPr>
-          </a:lstStyle>
-          <a:p>
-            <a:endParaRPr lang="en-US"/>
-          </a:p>
-        </p:txBody>
-      </p:sp>
-      <p:sp>
-        <p:nvSpPr>
-          <p:cNvPr id="7" name="Slide Number Placeholder 6"/>
-          <p:cNvSpPr>
-            <a:spLocks noGrp="1"/>
-          </p:cNvSpPr>
-          <p:nvPr>
-            <p:ph type="sldNum" sz="quarter" idx="5"/>
-          </p:nvPr>
-        </p:nvSpPr>
-        <p:spPr>
-          <a:xfrm>
-            <a:off x="3884613" y="8685213"/>
-            <a:ext cx="2971800" cy="457200"/>
-          </a:xfrm>
-          <a:prstGeom prst="rect">
-            <a:avLst/>
-          </a:prstGeom>
-        </p:spPr>
-        <p:txBody>
-          <a:bodyPr vert="horz" lIns="91440" tIns="45720" rIns="91440" bIns="45720" rtlCol="0" anchor="b"/>
-          <a:lstStyle>
-            <a:lvl1pPr algn="r">
-              <a:defRPr sz="1200"/>
-            </a:lvl1pPr>
-          </a:lstStyle>
-          <a:p>
-            <a:fld id="{BB5E49A5-4136-284D-997B-48E1D791AD67}" type="slidenum">
-              <a:rPr lang="en-US" smtClean="0"/>
-              <a:t>‹#›</a:t>
-            </a:fld>
-            <a:endParaRPr lang="en-US"/>
-          </a:p>
-        </p:txBody>
-      </p:sp>
-    </p:spTree>
-    <p:extLst>
-      <p:ext uri="{BB962C8B-B14F-4D97-AF65-F5344CB8AC3E}">
-        <p14:creationId xmlns:p14="http://schemas.microsoft.com/office/powerpoint/2010/main" val="2623252185"/>
-      </p:ext>
-    </p:extLst>
-  </p:cSld>
-  <p:clrMap bg1="lt1" tx1="dk1" bg2="lt2" tx2="dk2" accent1="accent1" accent2="accent2" accent3="accent3" accent4="accent4" accent5="accent5" accent6="accent6" hlink="hlink" folHlink="folHlink"/>
-  <p:notesStyle>
-    <a:lvl1pPr marL="0" algn="l" defTabSz="457200" rtl="0" eaLnBrk="1" latinLnBrk="0" hangingPunct="1">
-      <a:defRPr sz="1200" kern="1200">
-        <a:solidFill>
-          <a:schemeClr val="tx1"/>
-        </a:solidFill>
-        <a:latin typeface="+mn-lt"/>
-        <a:ea typeface="+mn-ea"/>
-        <a:cs typeface="+mn-cs"/>
-      </a:defRPr>
-    </a:lvl1pPr>
-    <a:lvl2pPr marL="457200" algn="l" defTabSz="457200" rtl="0" eaLnBrk="1" latinLnBrk="0" hangingPunct="1">
-      <a:defRPr sz="1200" kern="1200">
-        <a:solidFill>
-          <a:schemeClr val="tx1"/>
-        </a:solidFill>
-        <a:latin typeface="+mn-lt"/>
-        <a:ea typeface="+mn-ea"/>
-        <a:cs typeface="+mn-cs"/>
-      </a:defRPr>
-    </a:lvl2pPr>
-    <a:lvl3pPr marL="914400" algn="l" defTabSz="457200" rtl="0" eaLnBrk="1" latinLnBrk="0" hangingPunct="1">
-      <a:defRPr sz="1200" kern="1200">
-        <a:solidFill>
-          <a:schemeClr val="tx1"/>
-        </a:solidFill>
-        <a:latin typeface="+mn-lt"/>
-        <a:ea typeface="+mn-ea"/>
-        <a:cs typeface="+mn-cs"/>
-      </a:defRPr>
-    </a:lvl3pPr>
-    <a:lvl4pPr marL="1371600" algn="l" defTabSz="457200" rtl="0" eaLnBrk="1" latinLnBrk="0" hangingPunct="1">
-      <a:defRPr sz="1200" kern="1200">
-        <a:solidFill>
-          <a:schemeClr val="tx1"/>
-        </a:solidFill>
-        <a:latin typeface="+mn-lt"/>
-        <a:ea typeface="+mn-ea"/>
-        <a:cs typeface="+mn-cs"/>
-      </a:defRPr>
-    </a:lvl4pPr>
-    <a:lvl5pPr marL="1828800" algn="l" defTabSz="457200" rtl="0" eaLnBrk="1" latinLnBrk="0" hangingPunct="1">
-      <a:defRPr sz="1200" kern="1200">
-        <a:solidFill>
-          <a:schemeClr val="tx1"/>
-        </a:solidFill>
-        <a:latin typeface="+mn-lt"/>
-        <a:ea typeface="+mn-ea"/>
-        <a:cs typeface="+mn-cs"/>
-      </a:defRPr>
-    </a:lvl5pPr>
-    <a:lvl6pPr marL="2286000" algn="l" defTabSz="457200" rtl="0" eaLnBrk="1" latinLnBrk="0" hangingPunct="1">
-      <a:defRPr sz="1200" kern="1200">
-        <a:solidFill>
-          <a:schemeClr val="tx1"/>
-        </a:solidFill>
-        <a:latin typeface="+mn-lt"/>
-        <a:ea typeface="+mn-ea"/>
-        <a:cs typeface="+mn-cs"/>
-      </a:defRPr>
-    </a:lvl6pPr>
-    <a:lvl7pPr marL="2743200" algn="l" defTabSz="457200" rtl="0" eaLnBrk="1" latinLnBrk="0" hangingPunct="1">
-      <a:defRPr sz="1200" kern="1200">
-        <a:solidFill>
-          <a:schemeClr val="tx1"/>
-        </a:solidFill>
-        <a:latin typeface="+mn-lt"/>
-        <a:ea typeface="+mn-ea"/>
-        <a:cs typeface="+mn-cs"/>
-      </a:defRPr>
-    </a:lvl7pPr>
-    <a:lvl8pPr marL="3200400" algn="l" defTabSz="457200" rtl="0" eaLnBrk="1" latinLnBrk="0" hangingPunct="1">
-      <a:defRPr sz="1200" kern="1200">
-        <a:solidFill>
-          <a:schemeClr val="tx1"/>
-        </a:solidFill>
-        <a:latin typeface="+mn-lt"/>
-        <a:ea typeface="+mn-ea"/>
-        <a:cs typeface="+mn-cs"/>
-      </a:defRPr>
-    </a:lvl8pPr>
-    <a:lvl9pPr marL="3657600" algn="l" defTabSz="457200" rtl="0" eaLnBrk="1" latinLnBrk="0" hangingPunct="1">
-      <a:defRPr sz="1200" kern="1200">
-        <a:solidFill>
-          <a:schemeClr val="tx1"/>
-        </a:solidFill>
-        <a:latin typeface="+mn-lt"/>
-        <a:ea typeface="+mn-ea"/>
-        <a:cs typeface="+mn-cs"/>
-      </a:defRPr>
-    </a:lvl9pPr>
-  </p:notesStyle>
-</p:notesMaster>
-</file>
-
-<file path=ppt/notesSlides/notesSlide1.xml><?xml version="1.0" encoding="utf-8"?>
-<p:notes xmlns:a="http://schemas.openxmlformats.org/drawingml/2006/main" xmlns:p="http://schemas.openxmlformats.org/presentationml/2006/main" xmlns:r="http://schemas.openxmlformats.org/officeDocument/2006/relationships">
-  <p:cSld>
-    <p:spTree>
-      <p:nvGrpSpPr>
-        <p:cNvPr id="1" name=""/>
-        <p:cNvGrpSpPr/>
-        <p:nvPr/>
-      </p:nvGrpSpPr>
-      <p:grpSpPr>
-        <a:xfrm>
-          <a:off x="0" y="0"/>
-          <a:ext cx="0" cy="0"/>
-          <a:chOff x="0" y="0"/>
-          <a:chExt cx="0" cy="0"/>
-        </a:xfrm>
-      </p:grpSpPr>
-      <p:sp>
-        <p:nvSpPr>
-          <p:cNvPr id="2" name="Slide Image Placeholder 1"/>
-          <p:cNvSpPr>
-            <a:spLocks noGrp="1"/>
-          </p:cNvSpPr>
-          <p:nvPr>
-            <p:ph type="sldImg" idx="2"/>
-          </p:nvPr>
-        </p:nvSpPr>
-        <p:spPr/>
-      </p:sp>
-      <p:sp>
-        <p:nvSpPr>
-          <p:cNvPr id="3" name="Notes Placeholder 2"/>
-          <p:cNvSpPr>
-            <a:spLocks noGrp="1"/>
-          </p:cNvSpPr>
-          <p:nvPr>
-            <p:ph type="body" idx="3" sz="quarter"/>
-          </p:nvPr>
-        </p:nvSpPr>
-        <p:spPr/>
-        <p:txBody>
-          <a:bodyPr/>
-          <a:lstStyle/>
-          <a:p>
-            <a:r>
-              <a:t>📌 Generated by: https://github.com/aktsmm/Agent-Skills/tree/main/powerpoint-automation</a:t>
-            </a:r>
-          </a:p>
-        </p:txBody>
-      </p:sp>
-      <p:sp>
-        <p:nvSpPr>
-          <p:cNvPr id="4" name="Slide Number Placeholder 3"/>
-          <p:cNvSpPr>
-            <a:spLocks noGrp="1"/>
-          </p:cNvSpPr>
-          <p:nvPr>
-            <p:ph type="sldNum" idx="5" sz="quarter"/>
-          </p:nvPr>
-        </p:nvSpPr>
-        <p:spPr/>
-      </p:sp>
-    </p:spTree>
-  </p:cSld>
-  <p:clrMapOvr>
-    <a:masterClrMapping/>
-  </p:clrMapOvr>
-</p:notes>
-</file>
-
-<file path=ppt/notesSlides/notesSlide2.xml><?xml version="1.0" encoding="utf-8"?>
-<p:notes xmlns:a="http://schemas.openxmlformats.org/drawingml/2006/main" xmlns:p="http://schemas.openxmlformats.org/presentationml/2006/main" xmlns:r="http://schemas.openxmlformats.org/officeDocument/2006/relationships">
-  <p:cSld>
-    <p:spTree>
-      <p:nvGrpSpPr>
-        <p:cNvPr id="1" name=""/>
-        <p:cNvGrpSpPr/>
-        <p:nvPr/>
-      </p:nvGrpSpPr>
-      <p:grpSpPr>
-        <a:xfrm>
-          <a:off x="0" y="0"/>
-          <a:ext cx="0" cy="0"/>
-          <a:chOff x="0" y="0"/>
-          <a:chExt cx="0" cy="0"/>
-        </a:xfrm>
-      </p:grpSpPr>
-      <p:sp>
-        <p:nvSpPr>
-          <p:cNvPr id="2" name="Slide Image Placeholder 1"/>
-          <p:cNvSpPr>
-            <a:spLocks noGrp="1"/>
-          </p:cNvSpPr>
-          <p:nvPr>
-            <p:ph type="sldImg" idx="2"/>
-          </p:nvPr>
-        </p:nvSpPr>
-        <p:spPr/>
-      </p:sp>
-      <p:sp>
-        <p:nvSpPr>
-          <p:cNvPr id="3" name="Notes Placeholder 2"/>
-          <p:cNvSpPr>
-            <a:spLocks noGrp="1"/>
-          </p:cNvSpPr>
-          <p:nvPr>
-            <p:ph type="body" idx="3" sz="quarter"/>
-          </p:nvPr>
-        </p:nvSpPr>
-        <p:spPr/>
-        <p:txBody>
-          <a:bodyPr/>
-          <a:lstStyle/>
-          <a:p>
-            <a:r>
-              <a:t>---</a:t>
-            </a:r>
-          </a:p>
-          <a:p>
-            <a:r>
-              <a:t>🔧 This presentation was created using Ag-ppt-create</a:t>
-            </a:r>
-          </a:p>
-          <a:p>
-            <a:r>
-              <a:t>https://github.com/aktsmm/Agent-Skills/tree/main/powerpoint-automation</a:t>
-            </a:r>
-          </a:p>
-        </p:txBody>
-      </p:sp>
-      <p:sp>
-        <p:nvSpPr>
-          <p:cNvPr id="4" name="Slide Number Placeholder 3"/>
-          <p:cNvSpPr>
-            <a:spLocks noGrp="1"/>
-          </p:cNvSpPr>
-          <p:nvPr>
-            <p:ph type="sldNum" idx="5" sz="quarter"/>
-          </p:nvPr>
-        </p:nvSpPr>
-        <p:spPr/>
-      </p:sp>
-    </p:spTree>
-  </p:cSld>
-  <p:clrMapOvr>
-    <a:masterClrMapping/>
-  </p:clrMapOvr>
-</p:notes>
 </file>
 
 <file path=ppt/slideLayouts/slideLayout1.xml><?xml version="1.0" encoding="utf-8"?>
@@ -3613,6 +3123,13 @@
           <a:bodyPr/>
           <a:lstStyle/>
           <a:p>
+            <a:pPr algn="ctr">
+              <a:defRPr sz="4400" b="1">
+                <a:solidFill>
+                  <a:srgbClr val="0078D4"/>
+                </a:solidFill>
+              </a:defRPr>
+            </a:pPr>
             <a:r>
               <a:t>Azure Ops Dashboard</a:t>
             </a:r>
@@ -3634,10 +3151,25 @@
           <a:bodyPr/>
           <a:lstStyle/>
           <a:p>
+            <a:pPr algn="ctr">
+              <a:defRPr sz="2200">
+                <a:solidFill>
+                  <a:srgbClr val="646464"/>
+                </a:solidFill>
+              </a:defRPr>
+            </a:pPr>
             <a:r>
               <a:t>One-click Azure environment visualization &amp; AI-powered operational reports</a:t>
             </a:r>
-            <a:br/>
+          </a:p>
+          <a:p>
+            <a:pPr algn="ctr">
+              <a:defRPr sz="2200">
+                <a:solidFill>
+                  <a:srgbClr val="646464"/>
+                </a:solidFill>
+              </a:defRPr>
+            </a:pPr>
             <a:r>
               <a:t>FY26 GitHub Copilot SDK Enterprise Challenge</a:t>
             </a:r>
@@ -3677,60 +3209,94 @@
           <a:bodyPr/>
           <a:lstStyle/>
           <a:p>
-            <a:r>
-              <a:t>Key Design Decisions</a:t>
-            </a:r>
-          </a:p>
-        </p:txBody>
-      </p:sp>
-      <p:sp>
-        <p:nvSpPr>
-          <p:cNvPr id="3" name="Content Placeholder 2"/>
-          <p:cNvSpPr>
-            <a:spLocks noGrp="1"/>
-          </p:cNvSpPr>
-          <p:nvPr>
-            <p:ph idx="1"/>
-          </p:nvPr>
-        </p:nvSpPr>
-        <p:spPr/>
-        <p:txBody>
-          <a:bodyPr/>
-          <a:lstStyle/>
-          <a:p>
-            <a:pPr/>
-            <a:r>
-              <a:t>Template system: bundled defaults + user override (%APPDATA%)</a:t>
-            </a:r>
-          </a:p>
-          <a:p>
-            <a:pPr lvl="1"/>
-            <a:r>
-              <a:t>No exe rebuild needed to update report templates</a:t>
-            </a:r>
-          </a:p>
-          <a:p>
-            <a:pPr/>
-            <a:r>
-              <a:t>i18n: Japanese/English runtime switching (UI + reports)</a:t>
-            </a:r>
-          </a:p>
-          <a:p>
-            <a:pPr/>
-            <a:r>
-              <a:t>Read-only Azure operations only — Reader role minimum</a:t>
-            </a:r>
-          </a:p>
-          <a:p>
-            <a:pPr/>
-            <a:r>
-              <a:t>No secrets stored to disk — entered per-session via GUI</a:t>
-            </a:r>
-          </a:p>
-          <a:p>
-            <a:pPr/>
-            <a:r>
-              <a:t>32 unit tests runnable without Azure/SDK connectivity</a:t>
+            <a:pPr>
+              <a:defRPr sz="3200" b="1">
+                <a:solidFill>
+                  <a:srgbClr val="0078D4"/>
+                </a:solidFill>
+              </a:defRPr>
+            </a:pPr>
+            <a:r>
+              <a:t>GUI — Collect &amp; Diagram Generation</a:t>
+            </a:r>
+          </a:p>
+        </p:txBody>
+      </p:sp>
+      <p:sp>
+        <p:nvSpPr>
+          <p:cNvPr id="3" name="Rectangle 2"/>
+          <p:cNvSpPr/>
+          <p:nvPr/>
+        </p:nvSpPr>
+        <p:spPr>
+          <a:xfrm>
+            <a:off x="720000" y="1260000"/>
+            <a:ext cx="10752119" cy="5058000"/>
+          </a:xfrm>
+          <a:prstGeom prst="rect">
+            <a:avLst/>
+          </a:prstGeom>
+          <a:noFill/>
+          <a:ln w="19050">
+            <a:solidFill>
+              <a:srgbClr val="B4B4B4"/>
+            </a:solidFill>
+            <a:prstDash val="sysDash"/>
+          </a:ln>
+        </p:spPr>
+        <p:style>
+          <a:lnRef idx="1">
+            <a:schemeClr val="accent1"/>
+          </a:lnRef>
+          <a:fillRef idx="3">
+            <a:schemeClr val="accent1"/>
+          </a:fillRef>
+          <a:effectRef idx="2">
+            <a:schemeClr val="accent1"/>
+          </a:effectRef>
+          <a:fontRef idx="minor">
+            <a:schemeClr val="lt1"/>
+          </a:fontRef>
+        </p:style>
+        <p:txBody>
+          <a:bodyPr rtlCol="0" anchor="ctr"/>
+          <a:lstStyle/>
+          <a:p>
+            <a:pPr algn="ctr"/>
+          </a:p>
+        </p:txBody>
+      </p:sp>
+      <p:sp>
+        <p:nvSpPr>
+          <p:cNvPr id="4" name="TextBox 3"/>
+          <p:cNvSpPr txBox="1"/>
+          <p:nvPr/>
+        </p:nvSpPr>
+        <p:spPr>
+          <a:xfrm>
+            <a:off x="2160000" y="3240000"/>
+            <a:ext cx="7872119" cy="1080000"/>
+          </a:xfrm>
+          <a:prstGeom prst="rect">
+            <a:avLst/>
+          </a:prstGeom>
+          <a:noFill/>
+        </p:spPr>
+        <p:txBody>
+          <a:bodyPr wrap="square">
+            <a:spAutoFit/>
+          </a:bodyPr>
+          <a:lstStyle/>
+          <a:p>
+            <a:pPr algn="ctr">
+              <a:defRPr sz="2000" i="1">
+                <a:solidFill>
+                  <a:srgbClr val="B4B4B4"/>
+                </a:solidFill>
+              </a:defRPr>
+            </a:pPr>
+            <a:r>
+              <a:t>Insert screenshot: GUI main screen with diagram output</a:t>
             </a:r>
           </a:p>
         </p:txBody>
@@ -3768,8 +3334,203 @@
           <a:bodyPr/>
           <a:lstStyle/>
           <a:p>
-            <a:r>
-              <a:t>Repository &amp; Links</a:t>
+            <a:pPr>
+              <a:defRPr sz="3200" b="1">
+                <a:solidFill>
+                  <a:srgbClr val="0078D4"/>
+                </a:solidFill>
+              </a:defRPr>
+            </a:pPr>
+            <a:r>
+              <a:t>AI Report — Streaming Output</a:t>
+            </a:r>
+          </a:p>
+        </p:txBody>
+      </p:sp>
+      <p:sp>
+        <p:nvSpPr>
+          <p:cNvPr id="3" name="Rectangle 2"/>
+          <p:cNvSpPr/>
+          <p:nvPr/>
+        </p:nvSpPr>
+        <p:spPr>
+          <a:xfrm>
+            <a:off x="720000" y="1260000"/>
+            <a:ext cx="10752119" cy="5058000"/>
+          </a:xfrm>
+          <a:prstGeom prst="rect">
+            <a:avLst/>
+          </a:prstGeom>
+          <a:noFill/>
+          <a:ln w="19050">
+            <a:solidFill>
+              <a:srgbClr val="B4B4B4"/>
+            </a:solidFill>
+            <a:prstDash val="sysDash"/>
+          </a:ln>
+        </p:spPr>
+        <p:style>
+          <a:lnRef idx="1">
+            <a:schemeClr val="accent1"/>
+          </a:lnRef>
+          <a:fillRef idx="3">
+            <a:schemeClr val="accent1"/>
+          </a:fillRef>
+          <a:effectRef idx="2">
+            <a:schemeClr val="accent1"/>
+          </a:effectRef>
+          <a:fontRef idx="minor">
+            <a:schemeClr val="lt1"/>
+          </a:fontRef>
+        </p:style>
+        <p:txBody>
+          <a:bodyPr rtlCol="0" anchor="ctr"/>
+          <a:lstStyle/>
+          <a:p>
+            <a:pPr algn="ctr"/>
+          </a:p>
+        </p:txBody>
+      </p:sp>
+      <p:sp>
+        <p:nvSpPr>
+          <p:cNvPr id="4" name="TextBox 3"/>
+          <p:cNvSpPr txBox="1"/>
+          <p:nvPr/>
+        </p:nvSpPr>
+        <p:spPr>
+          <a:xfrm>
+            <a:off x="2160000" y="3240000"/>
+            <a:ext cx="7872119" cy="1080000"/>
+          </a:xfrm>
+          <a:prstGeom prst="rect">
+            <a:avLst/>
+          </a:prstGeom>
+          <a:noFill/>
+        </p:spPr>
+        <p:txBody>
+          <a:bodyPr wrap="square">
+            <a:spAutoFit/>
+          </a:bodyPr>
+          <a:lstStyle/>
+          <a:p>
+            <a:pPr algn="ctr">
+              <a:defRPr sz="2000" i="1">
+                <a:solidFill>
+                  <a:srgbClr val="B4B4B4"/>
+                </a:solidFill>
+              </a:defRPr>
+            </a:pPr>
+            <a:r>
+              <a:t>Insert screenshot: AI report generation with streaming text</a:t>
+            </a:r>
+          </a:p>
+        </p:txBody>
+      </p:sp>
+    </p:spTree>
+  </p:cSld>
+  <p:clrMapOvr>
+    <a:masterClrMapping/>
+  </p:clrMapOvr>
+</p:sld>
+</file>
+
+<file path=ppt/slides/slide12.xml><?xml version="1.0" encoding="utf-8"?>
+<p:sld xmlns:a="http://schemas.openxmlformats.org/drawingml/2006/main" xmlns:p="http://schemas.openxmlformats.org/presentationml/2006/main" xmlns:r="http://schemas.openxmlformats.org/officeDocument/2006/relationships">
+  <p:cSld>
+    <p:spTree>
+      <p:nvGrpSpPr>
+        <p:cNvPr id="1" name=""/>
+        <p:cNvGrpSpPr/>
+        <p:nvPr/>
+      </p:nvGrpSpPr>
+      <p:grpSpPr/>
+      <p:sp>
+        <p:nvSpPr>
+          <p:cNvPr id="2" name="Title 1"/>
+          <p:cNvSpPr>
+            <a:spLocks noGrp="1"/>
+          </p:cNvSpPr>
+          <p:nvPr>
+            <p:ph type="title"/>
+          </p:nvPr>
+        </p:nvSpPr>
+        <p:spPr/>
+        <p:txBody>
+          <a:bodyPr/>
+          <a:lstStyle/>
+          <a:p>
+            <a:pPr algn="ctr">
+              <a:defRPr sz="3600" b="1">
+                <a:solidFill>
+                  <a:srgbClr val="0078D4"/>
+                </a:solidFill>
+              </a:defRPr>
+            </a:pPr>
+            <a:r>
+              <a:t>Architecture &amp; Technical Highlights</a:t>
+            </a:r>
+          </a:p>
+        </p:txBody>
+      </p:sp>
+      <p:sp>
+        <p:nvSpPr>
+          <p:cNvPr id="3" name="Text Placeholder 2"/>
+          <p:cNvSpPr>
+            <a:spLocks noGrp="1"/>
+          </p:cNvSpPr>
+          <p:nvPr>
+            <p:ph type="body" idx="1"/>
+          </p:nvPr>
+        </p:nvSpPr>
+        <p:spPr/>
+        <p:txBody>
+          <a:bodyPr/>
+          <a:lstStyle/>
+          <a:p/>
+        </p:txBody>
+      </p:sp>
+    </p:spTree>
+  </p:cSld>
+  <p:clrMapOvr>
+    <a:masterClrMapping/>
+  </p:clrMapOvr>
+</p:sld>
+</file>
+
+<file path=ppt/slides/slide13.xml><?xml version="1.0" encoding="utf-8"?>
+<p:sld xmlns:a="http://schemas.openxmlformats.org/drawingml/2006/main" xmlns:p="http://schemas.openxmlformats.org/presentationml/2006/main" xmlns:r="http://schemas.openxmlformats.org/officeDocument/2006/relationships">
+  <p:cSld>
+    <p:spTree>
+      <p:nvGrpSpPr>
+        <p:cNvPr id="1" name=""/>
+        <p:cNvGrpSpPr/>
+        <p:nvPr/>
+      </p:nvGrpSpPr>
+      <p:grpSpPr/>
+      <p:sp>
+        <p:nvSpPr>
+          <p:cNvPr id="2" name="Title 1"/>
+          <p:cNvSpPr>
+            <a:spLocks noGrp="1"/>
+          </p:cNvSpPr>
+          <p:nvPr>
+            <p:ph type="title"/>
+          </p:nvPr>
+        </p:nvSpPr>
+        <p:spPr/>
+        <p:txBody>
+          <a:bodyPr/>
+          <a:lstStyle/>
+          <a:p>
+            <a:pPr>
+              <a:defRPr sz="3200" b="1">
+                <a:solidFill>
+                  <a:srgbClr val="0078D4"/>
+                </a:solidFill>
+              </a:defRPr>
+            </a:pPr>
+            <a:r>
+              <a:t>Architecture Overview</a:t>
             </a:r>
           </a:p>
         </p:txBody>
@@ -3786,36 +3547,738 @@
         </p:nvSpPr>
         <p:spPr/>
         <p:txBody>
-          <a:bodyPr/>
-          <a:lstStyle/>
-          <a:p>
-            <a:pPr/>
-            <a:r>
-              <a:t>Repository: https://github.com/aktsmm/azure-ops-dashboard</a:t>
-            </a:r>
-          </a:p>
-          <a:p>
-            <a:pPr/>
-            <a:r>
-              <a:t>License: CC-BY-NC-SA-4.0</a:t>
-            </a:r>
-          </a:p>
-          <a:p>
-            <a:pPr/>
-            <a:r>
-              <a:t>Language: Python 3.11+</a:t>
-            </a:r>
-          </a:p>
-          <a:p>
-            <a:pPr/>
-            <a:r>
-              <a:t>Tests: 32 tests (python -m unittest tests)</a:t>
-            </a:r>
-          </a:p>
-          <a:p>
-            <a:pPr/>
-            <a:r>
-              <a:t>Docs: README.md (EN/JA), DESIGN.md, AGENTS.md, RAI notes</a:t>
+          <a:bodyPr wrap="square"/>
+          <a:lstStyle/>
+          <a:p>
+            <a:pPr>
+              <a:spcAft>
+                <a:spcPts val="800"/>
+              </a:spcAft>
+              <a:defRPr sz="2800">
+                <a:solidFill>
+                  <a:srgbClr val="333333"/>
+                </a:solidFill>
+              </a:defRPr>
+            </a:pPr>
+            <a:r>
+              <a:t>Desktop GUI (tkinter) with threaded background workers</a:t>
+            </a:r>
+          </a:p>
+          <a:p>
+            <a:pPr>
+              <a:spcAft>
+                <a:spcPts val="800"/>
+              </a:spcAft>
+              <a:defRPr sz="2800">
+                <a:solidFill>
+                  <a:srgbClr val="333333"/>
+                </a:solidFill>
+              </a:defRPr>
+            </a:pPr>
+            <a:r>
+              <a:t>Data Collection: Azure CLI / Resource Graph / Security Center / Cost Mgmt / Advisor</a:t>
+            </a:r>
+          </a:p>
+          <a:p>
+            <a:pPr>
+              <a:spcAft>
+                <a:spcPts val="800"/>
+              </a:spcAft>
+              <a:defRPr sz="2800">
+                <a:solidFill>
+                  <a:srgbClr val="333333"/>
+                </a:solidFill>
+              </a:defRPr>
+            </a:pPr>
+            <a:r>
+              <a:t>AI Engine: GitHub Copilot SDK (CopilotClient streaming sessions)</a:t>
+            </a:r>
+          </a:p>
+          <a:p>
+            <a:pPr lvl="1">
+              <a:spcAft>
+                <a:spcPts val="400"/>
+              </a:spcAft>
+              <a:defRPr sz="2400">
+                <a:solidFill>
+                  <a:srgbClr val="646464"/>
+                </a:solidFill>
+              </a:defRPr>
+            </a:pPr>
+            <a:r>
+              <a:t>Enrichment: Microsoft Learn Search API + MCP server</a:t>
+            </a:r>
+          </a:p>
+        </p:txBody>
+      </p:sp>
+    </p:spTree>
+  </p:cSld>
+  <p:clrMapOvr>
+    <a:masterClrMapping/>
+  </p:clrMapOvr>
+</p:sld>
+</file>
+
+<file path=ppt/slides/slide14.xml><?xml version="1.0" encoding="utf-8"?>
+<p:sld xmlns:a="http://schemas.openxmlformats.org/drawingml/2006/main" xmlns:p="http://schemas.openxmlformats.org/presentationml/2006/main" xmlns:r="http://schemas.openxmlformats.org/officeDocument/2006/relationships">
+  <p:cSld>
+    <p:spTree>
+      <p:nvGrpSpPr>
+        <p:cNvPr id="1" name=""/>
+        <p:cNvGrpSpPr/>
+        <p:nvPr/>
+      </p:nvGrpSpPr>
+      <p:grpSpPr/>
+      <p:sp>
+        <p:nvSpPr>
+          <p:cNvPr id="2" name="Title 1"/>
+          <p:cNvSpPr>
+            <a:spLocks noGrp="1"/>
+          </p:cNvSpPr>
+          <p:nvPr>
+            <p:ph type="title"/>
+          </p:nvPr>
+        </p:nvSpPr>
+        <p:spPr/>
+        <p:txBody>
+          <a:bodyPr/>
+          <a:lstStyle/>
+          <a:p>
+            <a:pPr>
+              <a:defRPr sz="3200" b="1">
+                <a:solidFill>
+                  <a:srgbClr val="0078D4"/>
+                </a:solidFill>
+              </a:defRPr>
+            </a:pPr>
+            <a:r>
+              <a:t>Architecture Overview (cont.)</a:t>
+            </a:r>
+          </a:p>
+        </p:txBody>
+      </p:sp>
+      <p:sp>
+        <p:nvSpPr>
+          <p:cNvPr id="3" name="Content Placeholder 2"/>
+          <p:cNvSpPr>
+            <a:spLocks noGrp="1"/>
+          </p:cNvSpPr>
+          <p:nvPr>
+            <p:ph idx="1"/>
+          </p:nvPr>
+        </p:nvSpPr>
+        <p:spPr/>
+        <p:txBody>
+          <a:bodyPr wrap="square"/>
+          <a:lstStyle/>
+          <a:p>
+            <a:pPr>
+              <a:spcAft>
+                <a:spcPts val="800"/>
+              </a:spcAft>
+              <a:defRPr sz="2800">
+                <a:solidFill>
+                  <a:srgbClr val="333333"/>
+                </a:solidFill>
+              </a:defRPr>
+            </a:pPr>
+            <a:r>
+              <a:t>Output: Draw.io XML / Markdown / Word / PDF / diff reports</a:t>
+            </a:r>
+          </a:p>
+          <a:p>
+            <a:pPr>
+              <a:spcAft>
+                <a:spcPts val="800"/>
+              </a:spcAft>
+              <a:defRPr sz="2800">
+                <a:solidFill>
+                  <a:srgbClr val="333333"/>
+                </a:solidFill>
+              </a:defRPr>
+            </a:pPr>
+            <a:r>
+              <a:t>Packaging: PyInstaller single-exe distribution</a:t>
+            </a:r>
+          </a:p>
+          <a:p>
+            <a:pPr>
+              <a:spcAft>
+                <a:spcPts val="800"/>
+              </a:spcAft>
+              <a:defRPr sz="2800">
+                <a:solidFill>
+                  <a:srgbClr val="333333"/>
+                </a:solidFill>
+              </a:defRPr>
+            </a:pPr>
+            <a:r>
+              <a:t>Cross-platform: Windows (full + exe), macOS, Linux</a:t>
+            </a:r>
+          </a:p>
+        </p:txBody>
+      </p:sp>
+    </p:spTree>
+  </p:cSld>
+  <p:clrMapOvr>
+    <a:masterClrMapping/>
+  </p:clrMapOvr>
+</p:sld>
+</file>
+
+<file path=ppt/slides/slide15.xml><?xml version="1.0" encoding="utf-8"?>
+<p:sld xmlns:a="http://schemas.openxmlformats.org/drawingml/2006/main" xmlns:p="http://schemas.openxmlformats.org/presentationml/2006/main" xmlns:r="http://schemas.openxmlformats.org/officeDocument/2006/relationships">
+  <p:cSld>
+    <p:spTree>
+      <p:nvGrpSpPr>
+        <p:cNvPr id="1" name=""/>
+        <p:cNvGrpSpPr/>
+        <p:nvPr/>
+      </p:nvGrpSpPr>
+      <p:grpSpPr/>
+      <p:sp>
+        <p:nvSpPr>
+          <p:cNvPr id="2" name="Title 1"/>
+          <p:cNvSpPr>
+            <a:spLocks noGrp="1"/>
+          </p:cNvSpPr>
+          <p:nvPr>
+            <p:ph type="title"/>
+          </p:nvPr>
+        </p:nvSpPr>
+        <p:spPr/>
+        <p:txBody>
+          <a:bodyPr/>
+          <a:lstStyle/>
+          <a:p>
+            <a:pPr>
+              <a:defRPr sz="3200" b="1">
+                <a:solidFill>
+                  <a:srgbClr val="0078D4"/>
+                </a:solidFill>
+              </a:defRPr>
+            </a:pPr>
+            <a:r>
+              <a:t>GitHub Copilot SDK Integration</a:t>
+            </a:r>
+          </a:p>
+        </p:txBody>
+      </p:sp>
+      <p:sp>
+        <p:nvSpPr>
+          <p:cNvPr id="3" name="Content Placeholder 2"/>
+          <p:cNvSpPr>
+            <a:spLocks noGrp="1"/>
+          </p:cNvSpPr>
+          <p:nvPr>
+            <p:ph idx="1"/>
+          </p:nvPr>
+        </p:nvSpPr>
+        <p:spPr/>
+        <p:txBody>
+          <a:bodyPr wrap="square"/>
+          <a:lstStyle/>
+          <a:p>
+            <a:pPr>
+              <a:spcAft>
+                <a:spcPts val="800"/>
+              </a:spcAft>
+              <a:defRPr sz="2800">
+                <a:solidFill>
+                  <a:srgbClr val="333333"/>
+                </a:solidFill>
+              </a:defRPr>
+            </a:pPr>
+            <a:r>
+              <a:t>CopilotClient with streaming token callbacks</a:t>
+            </a:r>
+          </a:p>
+          <a:p>
+            <a:pPr lvl="1">
+              <a:spcAft>
+                <a:spcPts val="400"/>
+              </a:spcAft>
+              <a:defRPr sz="2400">
+                <a:solidFill>
+                  <a:srgbClr val="646464"/>
+                </a:solidFill>
+              </a:defRPr>
+            </a:pPr>
+            <a:r>
+              <a:t>Dynamic model selection: claude-sonnet (latest) / gpt-4.1 fallback</a:t>
+            </a:r>
+          </a:p>
+          <a:p>
+            <a:pPr>
+              <a:spcAft>
+                <a:spcPts val="800"/>
+              </a:spcAft>
+              <a:defRPr sz="2800">
+                <a:solidFill>
+                  <a:srgbClr val="333333"/>
+                </a:solidFill>
+              </a:defRPr>
+            </a:pPr>
+            <a:r>
+              <a:t>Read-only tool permissions (no write operations)</a:t>
+            </a:r>
+          </a:p>
+          <a:p>
+            <a:pPr>
+              <a:spcAft>
+                <a:spcPts val="800"/>
+              </a:spcAft>
+              <a:defRPr sz="2800">
+                <a:solidFill>
+                  <a:srgbClr val="333333"/>
+                </a:solidFill>
+              </a:defRPr>
+            </a:pPr>
+            <a:r>
+              <a:t>Microsoft Docs MCP for document-grounded analysis</a:t>
+            </a:r>
+          </a:p>
+        </p:txBody>
+      </p:sp>
+    </p:spTree>
+  </p:cSld>
+  <p:clrMapOvr>
+    <a:masterClrMapping/>
+  </p:clrMapOvr>
+</p:sld>
+</file>
+
+<file path=ppt/slides/slide16.xml><?xml version="1.0" encoding="utf-8"?>
+<p:sld xmlns:a="http://schemas.openxmlformats.org/drawingml/2006/main" xmlns:p="http://schemas.openxmlformats.org/presentationml/2006/main" xmlns:r="http://schemas.openxmlformats.org/officeDocument/2006/relationships">
+  <p:cSld>
+    <p:spTree>
+      <p:nvGrpSpPr>
+        <p:cNvPr id="1" name=""/>
+        <p:cNvGrpSpPr/>
+        <p:nvPr/>
+      </p:nvGrpSpPr>
+      <p:grpSpPr/>
+      <p:sp>
+        <p:nvSpPr>
+          <p:cNvPr id="2" name="Title 1"/>
+          <p:cNvSpPr>
+            <a:spLocks noGrp="1"/>
+          </p:cNvSpPr>
+          <p:nvPr>
+            <p:ph type="title"/>
+          </p:nvPr>
+        </p:nvSpPr>
+        <p:spPr/>
+        <p:txBody>
+          <a:bodyPr/>
+          <a:lstStyle/>
+          <a:p>
+            <a:pPr>
+              <a:defRPr sz="3200" b="1">
+                <a:solidFill>
+                  <a:srgbClr val="0078D4"/>
+                </a:solidFill>
+              </a:defRPr>
+            </a:pPr>
+            <a:r>
+              <a:t>SDK Integration (cont.)</a:t>
+            </a:r>
+          </a:p>
+        </p:txBody>
+      </p:sp>
+      <p:sp>
+        <p:nvSpPr>
+          <p:cNvPr id="3" name="Content Placeholder 2"/>
+          <p:cNvSpPr>
+            <a:spLocks noGrp="1"/>
+          </p:cNvSpPr>
+          <p:nvPr>
+            <p:ph idx="1"/>
+          </p:nvPr>
+        </p:nvSpPr>
+        <p:spPr/>
+        <p:txBody>
+          <a:bodyPr wrap="square"/>
+          <a:lstStyle/>
+          <a:p>
+            <a:pPr>
+              <a:spcAft>
+                <a:spcPts val="800"/>
+              </a:spcAft>
+              <a:defRPr sz="2800">
+                <a:solidFill>
+                  <a:srgbClr val="333333"/>
+                </a:solidFill>
+              </a:defRPr>
+            </a:pPr>
+            <a:r>
+              <a:t>Retry with exponential backoff + future.cancel() on timeout</a:t>
+            </a:r>
+          </a:p>
+          <a:p>
+            <a:pPr>
+              <a:spcAft>
+                <a:spcPts val="800"/>
+              </a:spcAft>
+              <a:defRPr sz="2800">
+                <a:solidFill>
+                  <a:srgbClr val="333333"/>
+                </a:solidFill>
+              </a:defRPr>
+            </a:pPr>
+            <a:r>
+              <a:t>Thread-safe streaming UI: atomic buffer swap at 100ms</a:t>
+            </a:r>
+          </a:p>
+          <a:p>
+            <a:pPr>
+              <a:spcAft>
+                <a:spcPts val="800"/>
+              </a:spcAft>
+              <a:defRPr sz="2800">
+                <a:solidFill>
+                  <a:srgbClr val="333333"/>
+                </a:solidFill>
+              </a:defRPr>
+            </a:pPr>
+            <a:r>
+              <a:t>Session hooks for tool permission control and observability</a:t>
+            </a:r>
+          </a:p>
+        </p:txBody>
+      </p:sp>
+    </p:spTree>
+  </p:cSld>
+  <p:clrMapOvr>
+    <a:masterClrMapping/>
+  </p:clrMapOvr>
+</p:sld>
+</file>
+
+<file path=ppt/slides/slide17.xml><?xml version="1.0" encoding="utf-8"?>
+<p:sld xmlns:a="http://schemas.openxmlformats.org/drawingml/2006/main" xmlns:p="http://schemas.openxmlformats.org/presentationml/2006/main" xmlns:r="http://schemas.openxmlformats.org/officeDocument/2006/relationships">
+  <p:cSld>
+    <p:spTree>
+      <p:nvGrpSpPr>
+        <p:cNvPr id="1" name=""/>
+        <p:cNvGrpSpPr/>
+        <p:nvPr/>
+      </p:nvGrpSpPr>
+      <p:grpSpPr/>
+      <p:sp>
+        <p:nvSpPr>
+          <p:cNvPr id="2" name="Title 1"/>
+          <p:cNvSpPr>
+            <a:spLocks noGrp="1"/>
+          </p:cNvSpPr>
+          <p:nvPr>
+            <p:ph type="title"/>
+          </p:nvPr>
+        </p:nvSpPr>
+        <p:spPr/>
+        <p:txBody>
+          <a:bodyPr/>
+          <a:lstStyle/>
+          <a:p>
+            <a:pPr>
+              <a:defRPr sz="3200" b="1">
+                <a:solidFill>
+                  <a:srgbClr val="0078D4"/>
+                </a:solidFill>
+              </a:defRPr>
+            </a:pPr>
+            <a:r>
+              <a:t>Azure Integration Points</a:t>
+            </a:r>
+          </a:p>
+        </p:txBody>
+      </p:sp>
+      <p:sp>
+        <p:nvSpPr>
+          <p:cNvPr id="3" name="Content Placeholder 2"/>
+          <p:cNvSpPr>
+            <a:spLocks noGrp="1"/>
+          </p:cNvSpPr>
+          <p:nvPr>
+            <p:ph idx="1"/>
+          </p:nvPr>
+        </p:nvSpPr>
+        <p:spPr/>
+        <p:txBody>
+          <a:bodyPr wrap="square"/>
+          <a:lstStyle/>
+          <a:p>
+            <a:pPr>
+              <a:spcAft>
+                <a:spcPts val="800"/>
+              </a:spcAft>
+              <a:defRPr sz="2800">
+                <a:solidFill>
+                  <a:srgbClr val="333333"/>
+                </a:solidFill>
+              </a:defRPr>
+            </a:pPr>
+            <a:r>
+              <a:t>Azure Resource Graph — full inventory across subscriptions</a:t>
+            </a:r>
+          </a:p>
+          <a:p>
+            <a:pPr>
+              <a:spcAft>
+                <a:spcPts val="800"/>
+              </a:spcAft>
+              <a:defRPr sz="2800">
+                <a:solidFill>
+                  <a:srgbClr val="333333"/>
+                </a:solidFill>
+              </a:defRPr>
+            </a:pPr>
+            <a:r>
+              <a:t>Microsoft Defender for Cloud — Secure Score, alerts, recommendations</a:t>
+            </a:r>
+          </a:p>
+          <a:p>
+            <a:pPr>
+              <a:spcAft>
+                <a:spcPts val="800"/>
+              </a:spcAft>
+              <a:defRPr sz="2800">
+                <a:solidFill>
+                  <a:srgbClr val="333333"/>
+                </a:solidFill>
+              </a:defRPr>
+            </a:pPr>
+            <a:r>
+              <a:t>Azure Cost Management — spend by service/resource group</a:t>
+            </a:r>
+          </a:p>
+        </p:txBody>
+      </p:sp>
+    </p:spTree>
+  </p:cSld>
+  <p:clrMapOvr>
+    <a:masterClrMapping/>
+  </p:clrMapOvr>
+</p:sld>
+</file>
+
+<file path=ppt/slides/slide18.xml><?xml version="1.0" encoding="utf-8"?>
+<p:sld xmlns:a="http://schemas.openxmlformats.org/drawingml/2006/main" xmlns:p="http://schemas.openxmlformats.org/presentationml/2006/main" xmlns:r="http://schemas.openxmlformats.org/officeDocument/2006/relationships">
+  <p:cSld>
+    <p:spTree>
+      <p:nvGrpSpPr>
+        <p:cNvPr id="1" name=""/>
+        <p:cNvGrpSpPr/>
+        <p:nvPr/>
+      </p:nvGrpSpPr>
+      <p:grpSpPr/>
+      <p:sp>
+        <p:nvSpPr>
+          <p:cNvPr id="2" name="Title 1"/>
+          <p:cNvSpPr>
+            <a:spLocks noGrp="1"/>
+          </p:cNvSpPr>
+          <p:nvPr>
+            <p:ph type="title"/>
+          </p:nvPr>
+        </p:nvSpPr>
+        <p:spPr/>
+        <p:txBody>
+          <a:bodyPr/>
+          <a:lstStyle/>
+          <a:p>
+            <a:pPr>
+              <a:defRPr sz="3200" b="1">
+                <a:solidFill>
+                  <a:srgbClr val="0078D4"/>
+                </a:solidFill>
+              </a:defRPr>
+            </a:pPr>
+            <a:r>
+              <a:t>Azure Integration (cont.)</a:t>
+            </a:r>
+          </a:p>
+        </p:txBody>
+      </p:sp>
+      <p:sp>
+        <p:nvSpPr>
+          <p:cNvPr id="3" name="Content Placeholder 2"/>
+          <p:cNvSpPr>
+            <a:spLocks noGrp="1"/>
+          </p:cNvSpPr>
+          <p:nvPr>
+            <p:ph idx="1"/>
+          </p:nvPr>
+        </p:nvSpPr>
+        <p:spPr/>
+        <p:txBody>
+          <a:bodyPr wrap="square"/>
+          <a:lstStyle/>
+          <a:p>
+            <a:pPr>
+              <a:spcAft>
+                <a:spcPts val="800"/>
+              </a:spcAft>
+              <a:defRPr sz="2800">
+                <a:solidFill>
+                  <a:srgbClr val="333333"/>
+                </a:solidFill>
+              </a:defRPr>
+            </a:pPr>
+            <a:r>
+              <a:t>Azure Advisor — optimization recommendations</a:t>
+            </a:r>
+          </a:p>
+          <a:p>
+            <a:pPr>
+              <a:spcAft>
+                <a:spcPts val="800"/>
+              </a:spcAft>
+              <a:defRPr sz="2800">
+                <a:solidFill>
+                  <a:srgbClr val="333333"/>
+                </a:solidFill>
+              </a:defRPr>
+            </a:pPr>
+            <a:r>
+              <a:t>Microsoft Learn Search API — enrichment for AI reports</a:t>
+            </a:r>
+          </a:p>
+          <a:p>
+            <a:pPr>
+              <a:spcAft>
+                <a:spcPts val="800"/>
+              </a:spcAft>
+              <a:defRPr sz="2800">
+                <a:solidFill>
+                  <a:srgbClr val="333333"/>
+                </a:solidFill>
+              </a:defRPr>
+            </a:pPr>
+            <a:r>
+              <a:t>Service Principal + Interactive login support</a:t>
+            </a:r>
+          </a:p>
+        </p:txBody>
+      </p:sp>
+    </p:spTree>
+  </p:cSld>
+  <p:clrMapOvr>
+    <a:masterClrMapping/>
+  </p:clrMapOvr>
+</p:sld>
+</file>
+
+<file path=ppt/slides/slide19.xml><?xml version="1.0" encoding="utf-8"?>
+<p:sld xmlns:a="http://schemas.openxmlformats.org/drawingml/2006/main" xmlns:p="http://schemas.openxmlformats.org/presentationml/2006/main" xmlns:r="http://schemas.openxmlformats.org/officeDocument/2006/relationships">
+  <p:cSld>
+    <p:spTree>
+      <p:nvGrpSpPr>
+        <p:cNvPr id="1" name=""/>
+        <p:cNvGrpSpPr/>
+        <p:nvPr/>
+      </p:nvGrpSpPr>
+      <p:grpSpPr/>
+      <p:sp>
+        <p:nvSpPr>
+          <p:cNvPr id="2" name="Title 1"/>
+          <p:cNvSpPr>
+            <a:spLocks noGrp="1"/>
+          </p:cNvSpPr>
+          <p:nvPr>
+            <p:ph type="title"/>
+          </p:nvPr>
+        </p:nvSpPr>
+        <p:spPr/>
+        <p:txBody>
+          <a:bodyPr/>
+          <a:lstStyle/>
+          <a:p>
+            <a:pPr>
+              <a:defRPr sz="3200" b="1">
+                <a:solidFill>
+                  <a:srgbClr val="0078D4"/>
+                </a:solidFill>
+              </a:defRPr>
+            </a:pPr>
+            <a:r>
+              <a:t>Key Design Decisions</a:t>
+            </a:r>
+          </a:p>
+        </p:txBody>
+      </p:sp>
+      <p:sp>
+        <p:nvSpPr>
+          <p:cNvPr id="3" name="Content Placeholder 2"/>
+          <p:cNvSpPr>
+            <a:spLocks noGrp="1"/>
+          </p:cNvSpPr>
+          <p:nvPr>
+            <p:ph idx="1"/>
+          </p:nvPr>
+        </p:nvSpPr>
+        <p:spPr/>
+        <p:txBody>
+          <a:bodyPr wrap="square"/>
+          <a:lstStyle/>
+          <a:p>
+            <a:pPr>
+              <a:spcAft>
+                <a:spcPts val="800"/>
+              </a:spcAft>
+              <a:defRPr sz="2800">
+                <a:solidFill>
+                  <a:srgbClr val="333333"/>
+                </a:solidFill>
+              </a:defRPr>
+            </a:pPr>
+            <a:r>
+              <a:t>Template system: bundled defaults + user override (%APPDATA%)</a:t>
+            </a:r>
+          </a:p>
+          <a:p>
+            <a:pPr lvl="1">
+              <a:spcAft>
+                <a:spcPts val="400"/>
+              </a:spcAft>
+              <a:defRPr sz="2400">
+                <a:solidFill>
+                  <a:srgbClr val="646464"/>
+                </a:solidFill>
+              </a:defRPr>
+            </a:pPr>
+            <a:r>
+              <a:t>No exe rebuild needed to update report templates</a:t>
+            </a:r>
+          </a:p>
+          <a:p>
+            <a:pPr>
+              <a:spcAft>
+                <a:spcPts val="800"/>
+              </a:spcAft>
+              <a:defRPr sz="2800">
+                <a:solidFill>
+                  <a:srgbClr val="333333"/>
+                </a:solidFill>
+              </a:defRPr>
+            </a:pPr>
+            <a:r>
+              <a:t>i18n: Japanese/English runtime switching (UI + reports)</a:t>
+            </a:r>
+          </a:p>
+          <a:p>
+            <a:pPr>
+              <a:spcAft>
+                <a:spcPts val="800"/>
+              </a:spcAft>
+              <a:defRPr sz="2800">
+                <a:solidFill>
+                  <a:srgbClr val="333333"/>
+                </a:solidFill>
+              </a:defRPr>
+            </a:pPr>
+            <a:r>
+              <a:t>Read-only Azure operations only — Reader role minimum</a:t>
             </a:r>
           </a:p>
         </p:txBody>
@@ -3848,18 +4311,281 @@
             <p:ph type="title"/>
           </p:nvPr>
         </p:nvSpPr>
-        <p:spPr>
-          <a:xfrm>
-            <a:off x="0" y="2400300"/>
-            <a:ext cx="10820519" cy="914400"/>
-          </a:xfrm>
-        </p:spPr>
-        <p:txBody>
-          <a:bodyPr wrap="none"/>
-          <a:lstStyle/>
-          <a:p>
+        <p:spPr/>
+        <p:txBody>
+          <a:bodyPr/>
+          <a:lstStyle/>
+          <a:p>
+            <a:pPr algn="ctr">
+              <a:defRPr sz="3600" b="1">
+                <a:solidFill>
+                  <a:srgbClr val="0078D4"/>
+                </a:solidFill>
+              </a:defRPr>
+            </a:pPr>
             <a:r>
               <a:t>Business Value Proposition</a:t>
+            </a:r>
+          </a:p>
+        </p:txBody>
+      </p:sp>
+      <p:sp>
+        <p:nvSpPr>
+          <p:cNvPr id="3" name="Text Placeholder 2"/>
+          <p:cNvSpPr>
+            <a:spLocks noGrp="1"/>
+          </p:cNvSpPr>
+          <p:nvPr>
+            <p:ph type="body" idx="1"/>
+          </p:nvPr>
+        </p:nvSpPr>
+        <p:spPr/>
+        <p:txBody>
+          <a:bodyPr/>
+          <a:lstStyle/>
+          <a:p/>
+        </p:txBody>
+      </p:sp>
+    </p:spTree>
+  </p:cSld>
+  <p:clrMapOvr>
+    <a:masterClrMapping/>
+  </p:clrMapOvr>
+</p:sld>
+</file>
+
+<file path=ppt/slides/slide20.xml><?xml version="1.0" encoding="utf-8"?>
+<p:sld xmlns:a="http://schemas.openxmlformats.org/drawingml/2006/main" xmlns:p="http://schemas.openxmlformats.org/presentationml/2006/main" xmlns:r="http://schemas.openxmlformats.org/officeDocument/2006/relationships">
+  <p:cSld>
+    <p:spTree>
+      <p:nvGrpSpPr>
+        <p:cNvPr id="1" name=""/>
+        <p:cNvGrpSpPr/>
+        <p:nvPr/>
+      </p:nvGrpSpPr>
+      <p:grpSpPr/>
+      <p:sp>
+        <p:nvSpPr>
+          <p:cNvPr id="2" name="Title 1"/>
+          <p:cNvSpPr>
+            <a:spLocks noGrp="1"/>
+          </p:cNvSpPr>
+          <p:nvPr>
+            <p:ph type="title"/>
+          </p:nvPr>
+        </p:nvSpPr>
+        <p:spPr/>
+        <p:txBody>
+          <a:bodyPr/>
+          <a:lstStyle/>
+          <a:p>
+            <a:pPr>
+              <a:defRPr sz="3200" b="1">
+                <a:solidFill>
+                  <a:srgbClr val="0078D4"/>
+                </a:solidFill>
+              </a:defRPr>
+            </a:pPr>
+            <a:r>
+              <a:t>Design Decisions (cont.)</a:t>
+            </a:r>
+          </a:p>
+        </p:txBody>
+      </p:sp>
+      <p:sp>
+        <p:nvSpPr>
+          <p:cNvPr id="3" name="Content Placeholder 2"/>
+          <p:cNvSpPr>
+            <a:spLocks noGrp="1"/>
+          </p:cNvSpPr>
+          <p:nvPr>
+            <p:ph idx="1"/>
+          </p:nvPr>
+        </p:nvSpPr>
+        <p:spPr/>
+        <p:txBody>
+          <a:bodyPr wrap="square"/>
+          <a:lstStyle/>
+          <a:p>
+            <a:pPr>
+              <a:spcAft>
+                <a:spcPts val="800"/>
+              </a:spcAft>
+              <a:defRPr sz="2800">
+                <a:solidFill>
+                  <a:srgbClr val="333333"/>
+                </a:solidFill>
+              </a:defRPr>
+            </a:pPr>
+            <a:r>
+              <a:t>No secrets stored to disk — entered per-session via GUI</a:t>
+            </a:r>
+          </a:p>
+          <a:p>
+            <a:pPr>
+              <a:spcAft>
+                <a:spcPts val="800"/>
+              </a:spcAft>
+              <a:defRPr sz="2800">
+                <a:solidFill>
+                  <a:srgbClr val="333333"/>
+                </a:solidFill>
+              </a:defRPr>
+            </a:pPr>
+            <a:r>
+              <a:t>32 unit tests runnable without Azure/SDK connectivity</a:t>
+            </a:r>
+          </a:p>
+          <a:p>
+            <a:pPr>
+              <a:spcAft>
+                <a:spcPts val="800"/>
+              </a:spcAft>
+              <a:defRPr sz="2800">
+                <a:solidFill>
+                  <a:srgbClr val="333333"/>
+                </a:solidFill>
+              </a:defRPr>
+            </a:pPr>
+            <a:r>
+              <a:t>Responsible AI: RAI notes, human oversight gates, least privilege</a:t>
+            </a:r>
+          </a:p>
+        </p:txBody>
+      </p:sp>
+    </p:spTree>
+  </p:cSld>
+  <p:clrMapOvr>
+    <a:masterClrMapping/>
+  </p:clrMapOvr>
+</p:sld>
+</file>
+
+<file path=ppt/slides/slide21.xml><?xml version="1.0" encoding="utf-8"?>
+<p:sld xmlns:a="http://schemas.openxmlformats.org/drawingml/2006/main" xmlns:p="http://schemas.openxmlformats.org/presentationml/2006/main" xmlns:r="http://schemas.openxmlformats.org/officeDocument/2006/relationships">
+  <p:cSld>
+    <p:spTree>
+      <p:nvGrpSpPr>
+        <p:cNvPr id="1" name=""/>
+        <p:cNvGrpSpPr/>
+        <p:nvPr/>
+      </p:nvGrpSpPr>
+      <p:grpSpPr/>
+      <p:sp>
+        <p:nvSpPr>
+          <p:cNvPr id="2" name="Title 1"/>
+          <p:cNvSpPr>
+            <a:spLocks noGrp="1"/>
+          </p:cNvSpPr>
+          <p:nvPr>
+            <p:ph type="title"/>
+          </p:nvPr>
+        </p:nvSpPr>
+        <p:spPr/>
+        <p:txBody>
+          <a:bodyPr/>
+          <a:lstStyle/>
+          <a:p>
+            <a:pPr>
+              <a:defRPr sz="3200" b="1">
+                <a:solidFill>
+                  <a:srgbClr val="0078D4"/>
+                </a:solidFill>
+              </a:defRPr>
+            </a:pPr>
+            <a:r>
+              <a:t>Repository &amp; Links</a:t>
+            </a:r>
+          </a:p>
+        </p:txBody>
+      </p:sp>
+      <p:sp>
+        <p:nvSpPr>
+          <p:cNvPr id="3" name="Content Placeholder 2"/>
+          <p:cNvSpPr>
+            <a:spLocks noGrp="1"/>
+          </p:cNvSpPr>
+          <p:nvPr>
+            <p:ph idx="1"/>
+          </p:nvPr>
+        </p:nvSpPr>
+        <p:spPr/>
+        <p:txBody>
+          <a:bodyPr wrap="square"/>
+          <a:lstStyle/>
+          <a:p>
+            <a:pPr>
+              <a:spcAft>
+                <a:spcPts val="800"/>
+              </a:spcAft>
+              <a:defRPr sz="2800">
+                <a:solidFill>
+                  <a:srgbClr val="333333"/>
+                </a:solidFill>
+              </a:defRPr>
+            </a:pPr>
+            <a:r>
+              <a:t>Repository: https://github.com/aktsmm/azure-ops-dashboard</a:t>
+            </a:r>
+          </a:p>
+          <a:p>
+            <a:pPr>
+              <a:spcAft>
+                <a:spcPts val="800"/>
+              </a:spcAft>
+              <a:defRPr sz="2800">
+                <a:solidFill>
+                  <a:srgbClr val="333333"/>
+                </a:solidFill>
+              </a:defRPr>
+            </a:pPr>
+            <a:r>
+              <a:t>License: CC-BY-NC-SA-4.0</a:t>
+            </a:r>
+          </a:p>
+          <a:p>
+            <a:pPr>
+              <a:spcAft>
+                <a:spcPts val="800"/>
+              </a:spcAft>
+              <a:defRPr sz="2800">
+                <a:solidFill>
+                  <a:srgbClr val="333333"/>
+                </a:solidFill>
+              </a:defRPr>
+            </a:pPr>
+            <a:r>
+              <a:t>Language: Python 3.11+</a:t>
+            </a:r>
+          </a:p>
+          <a:p>
+            <a:pPr>
+              <a:spcAft>
+                <a:spcPts val="800"/>
+              </a:spcAft>
+              <a:defRPr sz="2800">
+                <a:solidFill>
+                  <a:srgbClr val="333333"/>
+                </a:solidFill>
+              </a:defRPr>
+            </a:pPr>
+            <a:r>
+              <a:t>Tests: 32 tests (python -m unittest tests)</a:t>
+            </a:r>
+          </a:p>
+          <a:p>
+            <a:pPr>
+              <a:spcAft>
+                <a:spcPts val="800"/>
+              </a:spcAft>
+              <a:defRPr sz="2800">
+                <a:solidFill>
+                  <a:srgbClr val="333333"/>
+                </a:solidFill>
+              </a:defRPr>
+            </a:pPr>
+            <a:r>
+              <a:t>Docs: README.md (EN/JA), DESIGN.md, AGENTS.md, RAI notes</a:t>
             </a:r>
           </a:p>
         </p:txBody>
@@ -3897,6 +4623,13 @@
           <a:bodyPr/>
           <a:lstStyle/>
           <a:p>
+            <a:pPr>
+              <a:defRPr sz="3200" b="1">
+                <a:solidFill>
+                  <a:srgbClr val="0078D4"/>
+                </a:solidFill>
+              </a:defRPr>
+            </a:pPr>
             <a:r>
               <a:t>The Problem</a:t>
             </a:r>
@@ -3915,36 +4648,66 @@
         </p:nvSpPr>
         <p:spPr/>
         <p:txBody>
-          <a:bodyPr/>
-          <a:lstStyle/>
-          <a:p>
-            <a:pPr/>
+          <a:bodyPr wrap="square"/>
+          <a:lstStyle/>
+          <a:p>
+            <a:pPr>
+              <a:spcAft>
+                <a:spcPts val="800"/>
+              </a:spcAft>
+              <a:defRPr sz="2800">
+                <a:solidFill>
+                  <a:srgbClr val="333333"/>
+                </a:solidFill>
+              </a:defRPr>
+            </a:pPr>
             <a:r>
               <a:t>Enterprise IT teams manage complex Azure environments across multiple subscriptions</a:t>
             </a:r>
           </a:p>
           <a:p>
-            <a:pPr lvl="1"/>
+            <a:pPr lvl="1">
+              <a:spcAft>
+                <a:spcPts val="400"/>
+              </a:spcAft>
+              <a:defRPr sz="2400">
+                <a:solidFill>
+                  <a:srgbClr val="646464"/>
+                </a:solidFill>
+              </a:defRPr>
+            </a:pPr>
             <a:r>
               <a:t>Visualizing requires juggling Azure Portal, CLI, Resource Graph, and manual docs</a:t>
             </a:r>
           </a:p>
           <a:p>
-            <a:pPr/>
+            <a:pPr>
+              <a:spcAft>
+                <a:spcPts val="800"/>
+              </a:spcAft>
+              <a:defRPr sz="2800">
+                <a:solidFill>
+                  <a:srgbClr val="333333"/>
+                </a:solidFill>
+              </a:defRPr>
+            </a:pPr>
             <a:r>
               <a:t>Security posture and cost optimization reviews are manual and inconsistent</a:t>
             </a:r>
           </a:p>
           <a:p>
-            <a:pPr lvl="1"/>
+            <a:pPr lvl="1">
+              <a:spcAft>
+                <a:spcPts val="400"/>
+              </a:spcAft>
+              <a:defRPr sz="2400">
+                <a:solidFill>
+                  <a:srgbClr val="646464"/>
+                </a:solidFill>
+              </a:defRPr>
+            </a:pPr>
             <a:r>
               <a:t>No single tool provides As-Is diagrams + AI-driven operational insights</a:t>
-            </a:r>
-          </a:p>
-          <a:p>
-            <a:pPr/>
-            <a:r>
-              <a:t>Documentation becomes stale — environment drift goes undetected</a:t>
             </a:r>
           </a:p>
         </p:txBody>
@@ -3982,8 +4745,15 @@
           <a:bodyPr/>
           <a:lstStyle/>
           <a:p>
-            <a:r>
-              <a:t>The Solution: Azure Ops Dashboard</a:t>
+            <a:pPr>
+              <a:defRPr sz="3200" b="1">
+                <a:solidFill>
+                  <a:srgbClr val="0078D4"/>
+                </a:solidFill>
+              </a:defRPr>
+            </a:pPr>
+            <a:r>
+              <a:t>The Problem (cont.)</a:t>
             </a:r>
           </a:p>
         </p:txBody>
@@ -4000,60 +4770,36 @@
         </p:nvSpPr>
         <p:spPr/>
         <p:txBody>
-          <a:bodyPr/>
-          <a:lstStyle/>
-          <a:p>
-            <a:pPr/>
-            <a:r>
-              <a:t>One-click data collection via Azure Resource Graph</a:t>
-            </a:r>
-          </a:p>
-          <a:p>
-            <a:pPr lvl="1"/>
-            <a:r>
-              <a:t>Inventories all resources, networking, security, cost data</a:t>
-            </a:r>
-          </a:p>
-          <a:p>
-            <a:pPr/>
-            <a:r>
-              <a:t>Draw.io architecture diagrams with Azure-official icons</a:t>
-            </a:r>
-          </a:p>
-          <a:p>
-            <a:pPr lvl="1"/>
-            <a:r>
-              <a:t>Inventory view + Network topology (VNet/Subnet hierarchy)</a:t>
-            </a:r>
-          </a:p>
-          <a:p>
-            <a:pPr/>
-            <a:r>
-              <a:t>AI-powered reports via GitHub Copilot SDK</a:t>
-            </a:r>
-          </a:p>
-          <a:p>
-            <a:pPr lvl="1"/>
-            <a:r>
-              <a:t>Security: Secure Score, Defender, recommendations</a:t>
-            </a:r>
-          </a:p>
-          <a:p>
-            <a:pPr lvl="1"/>
-            <a:r>
-              <a:t>Cost: spend breakdown, optimization, Advisor integration</a:t>
-            </a:r>
-          </a:p>
-          <a:p>
-            <a:pPr/>
-            <a:r>
-              <a:t>Diff reports: automatic comparison with previous runs</a:t>
-            </a:r>
-          </a:p>
-          <a:p>
-            <a:pPr/>
-            <a:r>
-              <a:t>Desktop GUI (tkinter) — no cloud deployment required</a:t>
+          <a:bodyPr wrap="square"/>
+          <a:lstStyle/>
+          <a:p>
+            <a:pPr>
+              <a:spcAft>
+                <a:spcPts val="800"/>
+              </a:spcAft>
+              <a:defRPr sz="2800">
+                <a:solidFill>
+                  <a:srgbClr val="333333"/>
+                </a:solidFill>
+              </a:defRPr>
+            </a:pPr>
+            <a:r>
+              <a:t>Documentation becomes stale — environment drift goes undetected</a:t>
+            </a:r>
+          </a:p>
+          <a:p>
+            <a:pPr>
+              <a:spcAft>
+                <a:spcPts val="800"/>
+              </a:spcAft>
+              <a:defRPr sz="2800">
+                <a:solidFill>
+                  <a:srgbClr val="333333"/>
+                </a:solidFill>
+              </a:defRPr>
+            </a:pPr>
+            <a:r>
+              <a:t>Teams need quick, repeatable environment snapshots for audits, reviews, handoffs</a:t>
             </a:r>
           </a:p>
         </p:txBody>
@@ -4091,8 +4837,15 @@
           <a:bodyPr/>
           <a:lstStyle/>
           <a:p>
-            <a:r>
-              <a:t>Business Value</a:t>
+            <a:pPr>
+              <a:defRPr sz="3200" b="1">
+                <a:solidFill>
+                  <a:srgbClr val="0078D4"/>
+                </a:solidFill>
+              </a:defRPr>
+            </a:pPr>
+            <a:r>
+              <a:t>The Solution: Azure Ops Dashboard</a:t>
             </a:r>
           </a:p>
         </p:txBody>
@@ -4109,42 +4862,66 @@
         </p:nvSpPr>
         <p:spPr/>
         <p:txBody>
-          <a:bodyPr/>
-          <a:lstStyle/>
-          <a:p>
-            <a:pPr/>
-            <a:r>
-              <a:t>Time savings: Environment visualization in minutes, not hours</a:t>
-            </a:r>
-          </a:p>
-          <a:p>
-            <a:pPr/>
-            <a:r>
-              <a:t>Security: Early detection of misconfigurations and risks</a:t>
-            </a:r>
-          </a:p>
-          <a:p>
-            <a:pPr/>
-            <a:r>
-              <a:t>Cost optimization: AI-driven spend analysis and recommendations</a:t>
-            </a:r>
-          </a:p>
-          <a:p>
-            <a:pPr/>
-            <a:r>
-              <a:t>Drift tracking: Automated diff reports across time</a:t>
-            </a:r>
-          </a:p>
-          <a:p>
-            <a:pPr/>
-            <a:r>
-              <a:t>Reusability: Template system for customized reports per customer</a:t>
-            </a:r>
-          </a:p>
-          <a:p>
-            <a:pPr/>
-            <a:r>
-              <a:t>Amplification: Applicable to any Azure enterprise engagement</a:t>
+          <a:bodyPr wrap="square"/>
+          <a:lstStyle/>
+          <a:p>
+            <a:pPr>
+              <a:spcAft>
+                <a:spcPts val="800"/>
+              </a:spcAft>
+              <a:defRPr sz="2800">
+                <a:solidFill>
+                  <a:srgbClr val="333333"/>
+                </a:solidFill>
+              </a:defRPr>
+            </a:pPr>
+            <a:r>
+              <a:t>One-click data collection via Azure Resource Graph</a:t>
+            </a:r>
+          </a:p>
+          <a:p>
+            <a:pPr lvl="1">
+              <a:spcAft>
+                <a:spcPts val="400"/>
+              </a:spcAft>
+              <a:defRPr sz="2400">
+                <a:solidFill>
+                  <a:srgbClr val="646464"/>
+                </a:solidFill>
+              </a:defRPr>
+            </a:pPr>
+            <a:r>
+              <a:t>Inventories all resources, networking, security, cost data</a:t>
+            </a:r>
+          </a:p>
+          <a:p>
+            <a:pPr>
+              <a:spcAft>
+                <a:spcPts val="800"/>
+              </a:spcAft>
+              <a:defRPr sz="2800">
+                <a:solidFill>
+                  <a:srgbClr val="333333"/>
+                </a:solidFill>
+              </a:defRPr>
+            </a:pPr>
+            <a:r>
+              <a:t>Draw.io architecture diagrams with Azure-official icons</a:t>
+            </a:r>
+          </a:p>
+          <a:p>
+            <a:pPr lvl="1">
+              <a:spcAft>
+                <a:spcPts val="400"/>
+              </a:spcAft>
+              <a:defRPr sz="2400">
+                <a:solidFill>
+                  <a:srgbClr val="646464"/>
+                </a:solidFill>
+              </a:defRPr>
+            </a:pPr>
+            <a:r>
+              <a:t>Inventory view + Network topology (VNet/Subnet hierarchy)</a:t>
             </a:r>
           </a:p>
         </p:txBody>
@@ -4177,18 +4954,111 @@
             <p:ph type="title"/>
           </p:nvPr>
         </p:nvSpPr>
-        <p:spPr>
-          <a:xfrm>
-            <a:off x="0" y="2400300"/>
-            <a:ext cx="10820519" cy="914400"/>
-          </a:xfrm>
-        </p:spPr>
-        <p:txBody>
-          <a:bodyPr wrap="none"/>
-          <a:lstStyle/>
-          <a:p>
-            <a:r>
-              <a:t>Architecture &amp; Technical Highlights</a:t>
+        <p:spPr/>
+        <p:txBody>
+          <a:bodyPr/>
+          <a:lstStyle/>
+          <a:p>
+            <a:pPr>
+              <a:defRPr sz="3200" b="1">
+                <a:solidFill>
+                  <a:srgbClr val="0078D4"/>
+                </a:solidFill>
+              </a:defRPr>
+            </a:pPr>
+            <a:r>
+              <a:t>The Solution (cont.)</a:t>
+            </a:r>
+          </a:p>
+        </p:txBody>
+      </p:sp>
+      <p:sp>
+        <p:nvSpPr>
+          <p:cNvPr id="3" name="Content Placeholder 2"/>
+          <p:cNvSpPr>
+            <a:spLocks noGrp="1"/>
+          </p:cNvSpPr>
+          <p:nvPr>
+            <p:ph idx="1"/>
+          </p:nvPr>
+        </p:nvSpPr>
+        <p:spPr/>
+        <p:txBody>
+          <a:bodyPr wrap="square"/>
+          <a:lstStyle/>
+          <a:p>
+            <a:pPr>
+              <a:spcAft>
+                <a:spcPts val="800"/>
+              </a:spcAft>
+              <a:defRPr sz="2800">
+                <a:solidFill>
+                  <a:srgbClr val="333333"/>
+                </a:solidFill>
+              </a:defRPr>
+            </a:pPr>
+            <a:r>
+              <a:t>AI-powered reports via GitHub Copilot SDK</a:t>
+            </a:r>
+          </a:p>
+          <a:p>
+            <a:pPr lvl="1">
+              <a:spcAft>
+                <a:spcPts val="400"/>
+              </a:spcAft>
+              <a:defRPr sz="2400">
+                <a:solidFill>
+                  <a:srgbClr val="646464"/>
+                </a:solidFill>
+              </a:defRPr>
+            </a:pPr>
+            <a:r>
+              <a:t>Security: Secure Score, Defender, recommendations</a:t>
+            </a:r>
+          </a:p>
+          <a:p>
+            <a:pPr lvl="1">
+              <a:spcAft>
+                <a:spcPts val="400"/>
+              </a:spcAft>
+              <a:defRPr sz="2400">
+                <a:solidFill>
+                  <a:srgbClr val="646464"/>
+                </a:solidFill>
+              </a:defRPr>
+            </a:pPr>
+            <a:r>
+              <a:t>Cost: spend breakdown, optimization, Advisor integration</a:t>
+            </a:r>
+          </a:p>
+          <a:p>
+            <a:pPr>
+              <a:spcAft>
+                <a:spcPts val="800"/>
+              </a:spcAft>
+              <a:defRPr sz="2800">
+                <a:solidFill>
+                  <a:srgbClr val="333333"/>
+                </a:solidFill>
+              </a:defRPr>
+            </a:pPr>
+            <a:r>
+              <a:t>Diff reports: automatic comparison with previous runs</a:t>
+            </a:r>
+          </a:p>
+          <a:p>
+            <a:pPr>
+              <a:spcAft>
+                <a:spcPts val="800"/>
+              </a:spcAft>
+              <a:defRPr sz="2800">
+                <a:solidFill>
+                  <a:srgbClr val="333333"/>
+                </a:solidFill>
+              </a:defRPr>
+            </a:pPr>
+            <a:r>
+              <a:t>Desktop GUI (tkinter) — no cloud deployment required</a:t>
             </a:r>
           </a:p>
         </p:txBody>
@@ -4226,8 +5096,15 @@
           <a:bodyPr/>
           <a:lstStyle/>
           <a:p>
-            <a:r>
-              <a:t>Architecture Overview</a:t>
+            <a:pPr>
+              <a:defRPr sz="3200" b="1">
+                <a:solidFill>
+                  <a:srgbClr val="0078D4"/>
+                </a:solidFill>
+              </a:defRPr>
+            </a:pPr>
+            <a:r>
+              <a:t>Business Value</a:t>
             </a:r>
           </a:p>
         </p:txBody>
@@ -4244,42 +5121,51 @@
         </p:nvSpPr>
         <p:spPr/>
         <p:txBody>
-          <a:bodyPr/>
-          <a:lstStyle/>
-          <a:p>
-            <a:pPr/>
-            <a:r>
-              <a:t>Desktop GUI (tkinter) with threaded background workers</a:t>
-            </a:r>
-          </a:p>
-          <a:p>
-            <a:pPr/>
-            <a:r>
-              <a:t>Data Collection: Azure CLI / Resource Graph / Security Center / Cost Mgmt / Advisor</a:t>
-            </a:r>
-          </a:p>
-          <a:p>
-            <a:pPr/>
-            <a:r>
-              <a:t>AI Engine: GitHub Copilot SDK (CopilotClient streaming sessions)</a:t>
-            </a:r>
-          </a:p>
-          <a:p>
-            <a:pPr lvl="1"/>
-            <a:r>
-              <a:t>Enrichment: Microsoft Learn Search API + MCP server</a:t>
-            </a:r>
-          </a:p>
-          <a:p>
-            <a:pPr/>
-            <a:r>
-              <a:t>Output: Draw.io XML / Markdown / Word / PDF / diff reports</a:t>
-            </a:r>
-          </a:p>
-          <a:p>
-            <a:pPr/>
-            <a:r>
-              <a:t>Packaging: PyInstaller single-exe distribution</a:t>
+          <a:bodyPr wrap="square"/>
+          <a:lstStyle/>
+          <a:p>
+            <a:pPr>
+              <a:spcAft>
+                <a:spcPts val="800"/>
+              </a:spcAft>
+              <a:defRPr sz="2800">
+                <a:solidFill>
+                  <a:srgbClr val="333333"/>
+                </a:solidFill>
+              </a:defRPr>
+            </a:pPr>
+            <a:r>
+              <a:t>Time savings: Environment visualization in minutes, not hours</a:t>
+            </a:r>
+          </a:p>
+          <a:p>
+            <a:pPr>
+              <a:spcAft>
+                <a:spcPts val="800"/>
+              </a:spcAft>
+              <a:defRPr sz="2800">
+                <a:solidFill>
+                  <a:srgbClr val="333333"/>
+                </a:solidFill>
+              </a:defRPr>
+            </a:pPr>
+            <a:r>
+              <a:t>Security: Early detection of misconfigurations and risks</a:t>
+            </a:r>
+          </a:p>
+          <a:p>
+            <a:pPr>
+              <a:spcAft>
+                <a:spcPts val="800"/>
+              </a:spcAft>
+              <a:defRPr sz="2800">
+                <a:solidFill>
+                  <a:srgbClr val="333333"/>
+                </a:solidFill>
+              </a:defRPr>
+            </a:pPr>
+            <a:r>
+              <a:t>Cost optimization: AI-driven spend analysis and recommendations</a:t>
             </a:r>
           </a:p>
         </p:txBody>
@@ -4317,8 +5203,15 @@
           <a:bodyPr/>
           <a:lstStyle/>
           <a:p>
-            <a:r>
-              <a:t>GitHub Copilot SDK Integration</a:t>
+            <a:pPr>
+              <a:defRPr sz="3200" b="1">
+                <a:solidFill>
+                  <a:srgbClr val="0078D4"/>
+                </a:solidFill>
+              </a:defRPr>
+            </a:pPr>
+            <a:r>
+              <a:t>Business Value (cont.)</a:t>
             </a:r>
           </a:p>
         </p:txBody>
@@ -4335,42 +5228,51 @@
         </p:nvSpPr>
         <p:spPr/>
         <p:txBody>
-          <a:bodyPr/>
-          <a:lstStyle/>
-          <a:p>
-            <a:pPr/>
-            <a:r>
-              <a:t>CopilotClient with streaming token callbacks</a:t>
-            </a:r>
-          </a:p>
-          <a:p>
-            <a:pPr lvl="1"/>
-            <a:r>
-              <a:t>Dynamic model selection: claude-sonnet (latest) / gpt-4.1 fallback</a:t>
-            </a:r>
-          </a:p>
-          <a:p>
-            <a:pPr/>
-            <a:r>
-              <a:t>Read-only tool permissions (no write operations)</a:t>
-            </a:r>
-          </a:p>
-          <a:p>
-            <a:pPr/>
-            <a:r>
-              <a:t>Microsoft Docs MCP for document-grounded analysis</a:t>
-            </a:r>
-          </a:p>
-          <a:p>
-            <a:pPr/>
-            <a:r>
-              <a:t>Retry with exponential backoff + future.cancel() on timeout</a:t>
-            </a:r>
-          </a:p>
-          <a:p>
-            <a:pPr/>
-            <a:r>
-              <a:t>Thread-safe streaming UI: atomic buffer swap at 100ms</a:t>
+          <a:bodyPr wrap="square"/>
+          <a:lstStyle/>
+          <a:p>
+            <a:pPr>
+              <a:spcAft>
+                <a:spcPts val="800"/>
+              </a:spcAft>
+              <a:defRPr sz="2800">
+                <a:solidFill>
+                  <a:srgbClr val="333333"/>
+                </a:solidFill>
+              </a:defRPr>
+            </a:pPr>
+            <a:r>
+              <a:t>Drift tracking: Automated diff reports across time</a:t>
+            </a:r>
+          </a:p>
+          <a:p>
+            <a:pPr>
+              <a:spcAft>
+                <a:spcPts val="800"/>
+              </a:spcAft>
+              <a:defRPr sz="2800">
+                <a:solidFill>
+                  <a:srgbClr val="333333"/>
+                </a:solidFill>
+              </a:defRPr>
+            </a:pPr>
+            <a:r>
+              <a:t>Reusability: Template system for customized reports per customer</a:t>
+            </a:r>
+          </a:p>
+          <a:p>
+            <a:pPr>
+              <a:spcAft>
+                <a:spcPts val="800"/>
+              </a:spcAft>
+              <a:defRPr sz="2800">
+                <a:solidFill>
+                  <a:srgbClr val="333333"/>
+                </a:solidFill>
+              </a:defRPr>
+            </a:pPr>
+            <a:r>
+              <a:t>Amplification: Applicable to any Azure enterprise engagement</a:t>
             </a:r>
           </a:p>
         </p:txBody>
@@ -4408,62 +5310,34 @@
           <a:bodyPr/>
           <a:lstStyle/>
           <a:p>
-            <a:r>
-              <a:t>Azure Integration Points</a:t>
-            </a:r>
-          </a:p>
-        </p:txBody>
-      </p:sp>
-      <p:sp>
-        <p:nvSpPr>
-          <p:cNvPr id="3" name="Content Placeholder 2"/>
-          <p:cNvSpPr>
-            <a:spLocks noGrp="1"/>
-          </p:cNvSpPr>
-          <p:nvPr>
-            <p:ph idx="1"/>
-          </p:nvPr>
-        </p:nvSpPr>
-        <p:spPr/>
-        <p:txBody>
-          <a:bodyPr/>
-          <a:lstStyle/>
-          <a:p>
-            <a:pPr/>
-            <a:r>
-              <a:t>Azure Resource Graph — full inventory across subscriptions</a:t>
-            </a:r>
-          </a:p>
-          <a:p>
-            <a:pPr/>
-            <a:r>
-              <a:t>Microsoft Defender for Cloud — Secure Score, alerts, recommendations</a:t>
-            </a:r>
-          </a:p>
-          <a:p>
-            <a:pPr/>
-            <a:r>
-              <a:t>Azure Cost Management — spend by service/resource group</a:t>
-            </a:r>
-          </a:p>
-          <a:p>
-            <a:pPr/>
-            <a:r>
-              <a:t>Azure Advisor — optimization recommendations</a:t>
-            </a:r>
-          </a:p>
-          <a:p>
-            <a:pPr/>
-            <a:r>
-              <a:t>Microsoft Learn Search API — enrichment for AI reports</a:t>
-            </a:r>
-          </a:p>
-          <a:p>
-            <a:pPr/>
-            <a:r>
-              <a:t>Service Principal + Interactive login support</a:t>
-            </a:r>
-          </a:p>
+            <a:pPr algn="ctr">
+              <a:defRPr sz="3600" b="1">
+                <a:solidFill>
+                  <a:srgbClr val="0078D4"/>
+                </a:solidFill>
+              </a:defRPr>
+            </a:pPr>
+            <a:r>
+              <a:t>Demo &amp; Screenshots</a:t>
+            </a:r>
+          </a:p>
+        </p:txBody>
+      </p:sp>
+      <p:sp>
+        <p:nvSpPr>
+          <p:cNvPr id="3" name="Text Placeholder 2"/>
+          <p:cNvSpPr>
+            <a:spLocks noGrp="1"/>
+          </p:cNvSpPr>
+          <p:nvPr>
+            <p:ph type="body" idx="1"/>
+          </p:nvPr>
+        </p:nvSpPr>
+        <p:spPr/>
+        <p:txBody>
+          <a:bodyPr/>
+          <a:lstStyle/>
+          <a:p/>
         </p:txBody>
       </p:sp>
     </p:spTree>
@@ -4792,324 +5666,4 @@
   </a:objectDefaults>
   <a:extraClrSchemeLst/>
 </a:theme>
-</file>
-
-<file path=ppt/theme/theme2.xml><?xml version="1.0" encoding="utf-8"?>
-<a:theme xmlns:a="http://schemas.openxmlformats.org/drawingml/2006/main" name="Office Theme">
-  <a:themeElements>
-    <a:clrScheme name="Office">
-      <a:dk1>
-        <a:sysClr val="windowText" lastClr="000000"/>
-      </a:dk1>
-      <a:lt1>
-        <a:sysClr val="window" lastClr="FFFFFF"/>
-      </a:lt1>
-      <a:dk2>
-        <a:srgbClr val="1F497D"/>
-      </a:dk2>
-      <a:lt2>
-        <a:srgbClr val="EEECE1"/>
-      </a:lt2>
-      <a:accent1>
-        <a:srgbClr val="4F81BD"/>
-      </a:accent1>
-      <a:accent2>
-        <a:srgbClr val="C0504D"/>
-      </a:accent2>
-      <a:accent3>
-        <a:srgbClr val="9BBB59"/>
-      </a:accent3>
-      <a:accent4>
-        <a:srgbClr val="8064A2"/>
-      </a:accent4>
-      <a:accent5>
-        <a:srgbClr val="4BACC6"/>
-      </a:accent5>
-      <a:accent6>
-        <a:srgbClr val="F79646"/>
-      </a:accent6>
-      <a:hlink>
-        <a:srgbClr val="0000FF"/>
-      </a:hlink>
-      <a:folHlink>
-        <a:srgbClr val="800080"/>
-      </a:folHlink>
-    </a:clrScheme>
-    <a:fontScheme name="Office">
-      <a:majorFont>
-        <a:latin typeface="Calibri"/>
-        <a:ea typeface=""/>
-        <a:cs typeface=""/>
-        <a:font script="Jpan" typeface="ＭＳ Ｐゴシック"/>
-        <a:font script="Hang" typeface="맑은 고딕"/>
-        <a:font script="Hans" typeface="宋体"/>
-        <a:font script="Hant" typeface="新細明體"/>
-        <a:font script="Arab" typeface="Times New Roman"/>
-        <a:font script="Hebr" typeface="Times New Roman"/>
-        <a:font script="Thai" typeface="Angsana New"/>
-        <a:font script="Ethi" typeface="Nyala"/>
-        <a:font script="Beng" typeface="Vrinda"/>
-        <a:font script="Gujr" typeface="Shruti"/>
-        <a:font script="Khmr" typeface="MoolBoran"/>
-        <a:font script="Knda" typeface="Tunga"/>
-        <a:font script="Guru" typeface="Raavi"/>
-        <a:font script="Cans" typeface="Euphemia"/>
-        <a:font script="Cher" typeface="Plantagenet Cherokee"/>
-        <a:font script="Yiii" typeface="Microsoft Yi Baiti"/>
-        <a:font script="Tibt" typeface="Microsoft Himalaya"/>
-        <a:font script="Thaa" typeface="MV Boli"/>
-        <a:font script="Deva" typeface="Mangal"/>
-        <a:font script="Telu" typeface="Gautami"/>
-        <a:font script="Taml" typeface="Latha"/>
-        <a:font script="Syrc" typeface="Estrangelo Edessa"/>
-        <a:font script="Orya" typeface="Kalinga"/>
-        <a:font script="Mlym" typeface="Kartika"/>
-        <a:font script="Laoo" typeface="DokChampa"/>
-        <a:font script="Sinh" typeface="Iskoola Pota"/>
-        <a:font script="Mong" typeface="Mongolian Baiti"/>
-        <a:font script="Viet" typeface="Times New Roman"/>
-        <a:font script="Uigh" typeface="Microsoft Uighur"/>
-        <a:font script="Geor" typeface="Sylfaen"/>
-      </a:majorFont>
-      <a:minorFont>
-        <a:latin typeface="Calibri"/>
-        <a:ea typeface=""/>
-        <a:cs typeface=""/>
-        <a:font script="Jpan" typeface="ＭＳ Ｐゴシック"/>
-        <a:font script="Hang" typeface="맑은 고딕"/>
-        <a:font script="Hans" typeface="宋体"/>
-        <a:font script="Hant" typeface="新細明體"/>
-        <a:font script="Arab" typeface="Arial"/>
-        <a:font script="Hebr" typeface="Arial"/>
-        <a:font script="Thai" typeface="Cordia New"/>
-        <a:font script="Ethi" typeface="Nyala"/>
-        <a:font script="Beng" typeface="Vrinda"/>
-        <a:font script="Gujr" typeface="Shruti"/>
-        <a:font script="Khmr" typeface="DaunPenh"/>
-        <a:font script="Knda" typeface="Tunga"/>
-        <a:font script="Guru" typeface="Raavi"/>
-        <a:font script="Cans" typeface="Euphemia"/>
-        <a:font script="Cher" typeface="Plantagenet Cherokee"/>
-        <a:font script="Yiii" typeface="Microsoft Yi Baiti"/>
-        <a:font script="Tibt" typeface="Microsoft Himalaya"/>
-        <a:font script="Thaa" typeface="MV Boli"/>
-        <a:font script="Deva" typeface="Mangal"/>
-        <a:font script="Telu" typeface="Gautami"/>
-        <a:font script="Taml" typeface="Latha"/>
-        <a:font script="Syrc" typeface="Estrangelo Edessa"/>
-        <a:font script="Orya" typeface="Kalinga"/>
-        <a:font script="Mlym" typeface="Kartika"/>
-        <a:font script="Laoo" typeface="DokChampa"/>
-        <a:font script="Sinh" typeface="Iskoola Pota"/>
-        <a:font script="Mong" typeface="Mongolian Baiti"/>
-        <a:font script="Viet" typeface="Arial"/>
-        <a:font script="Uigh" typeface="Microsoft Uighur"/>
-        <a:font script="Geor" typeface="Sylfaen"/>
-      </a:minorFont>
-    </a:fontScheme>
-    <a:fmtScheme name="Office">
-      <a:fillStyleLst>
-        <a:solidFill>
-          <a:schemeClr val="phClr"/>
-        </a:solidFill>
-        <a:gradFill rotWithShape="1">
-          <a:gsLst>
-            <a:gs pos="0">
-              <a:schemeClr val="phClr">
-                <a:tint val="50000"/>
-                <a:satMod val="300000"/>
-              </a:schemeClr>
-            </a:gs>
-            <a:gs pos="35000">
-              <a:schemeClr val="phClr">
-                <a:tint val="37000"/>
-                <a:satMod val="300000"/>
-              </a:schemeClr>
-            </a:gs>
-            <a:gs pos="100000">
-              <a:schemeClr val="phClr">
-                <a:tint val="15000"/>
-                <a:satMod val="350000"/>
-              </a:schemeClr>
-            </a:gs>
-          </a:gsLst>
-          <a:lin ang="16200000" scaled="1"/>
-        </a:gradFill>
-        <a:gradFill rotWithShape="1">
-          <a:gsLst>
-            <a:gs pos="0">
-              <a:schemeClr val="phClr">
-                <a:tint val="100000"/>
-                <a:shade val="100000"/>
-                <a:satMod val="130000"/>
-              </a:schemeClr>
-            </a:gs>
-            <a:gs pos="100000">
-              <a:schemeClr val="phClr">
-                <a:tint val="50000"/>
-                <a:shade val="100000"/>
-                <a:satMod val="350000"/>
-              </a:schemeClr>
-            </a:gs>
-          </a:gsLst>
-          <a:lin ang="16200000" scaled="0"/>
-        </a:gradFill>
-      </a:fillStyleLst>
-      <a:lnStyleLst>
-        <a:ln w="9525" cap="flat" cmpd="sng" algn="ctr">
-          <a:solidFill>
-            <a:schemeClr val="phClr">
-              <a:shade val="95000"/>
-              <a:satMod val="105000"/>
-            </a:schemeClr>
-          </a:solidFill>
-          <a:prstDash val="solid"/>
-        </a:ln>
-        <a:ln w="25400" cap="flat" cmpd="sng" algn="ctr">
-          <a:solidFill>
-            <a:schemeClr val="phClr"/>
-          </a:solidFill>
-          <a:prstDash val="solid"/>
-        </a:ln>
-        <a:ln w="38100" cap="flat" cmpd="sng" algn="ctr">
-          <a:solidFill>
-            <a:schemeClr val="phClr"/>
-          </a:solidFill>
-          <a:prstDash val="solid"/>
-        </a:ln>
-      </a:lnStyleLst>
-      <a:effectStyleLst>
-        <a:effectStyle>
-          <a:effectLst>
-            <a:outerShdw blurRad="40000" dist="20000" dir="5400000" rotWithShape="0">
-              <a:srgbClr val="000000">
-                <a:alpha val="38000"/>
-              </a:srgbClr>
-            </a:outerShdw>
-          </a:effectLst>
-        </a:effectStyle>
-        <a:effectStyle>
-          <a:effectLst>
-            <a:outerShdw blurRad="40000" dist="23000" dir="5400000" rotWithShape="0">
-              <a:srgbClr val="000000">
-                <a:alpha val="35000"/>
-              </a:srgbClr>
-            </a:outerShdw>
-          </a:effectLst>
-        </a:effectStyle>
-        <a:effectStyle>
-          <a:effectLst>
-            <a:outerShdw blurRad="40000" dist="23000" dir="5400000" rotWithShape="0">
-              <a:srgbClr val="000000">
-                <a:alpha val="35000"/>
-              </a:srgbClr>
-            </a:outerShdw>
-          </a:effectLst>
-          <a:scene3d>
-            <a:camera prst="orthographicFront">
-              <a:rot lat="0" lon="0" rev="0"/>
-            </a:camera>
-            <a:lightRig rig="threePt" dir="t">
-              <a:rot lat="0" lon="0" rev="1200000"/>
-            </a:lightRig>
-          </a:scene3d>
-          <a:sp3d>
-            <a:bevelT w="63500" h="25400"/>
-          </a:sp3d>
-        </a:effectStyle>
-      </a:effectStyleLst>
-      <a:bgFillStyleLst>
-        <a:solidFill>
-          <a:schemeClr val="phClr"/>
-        </a:solidFill>
-        <a:gradFill rotWithShape="1">
-          <a:gsLst>
-            <a:gs pos="0">
-              <a:schemeClr val="phClr">
-                <a:tint val="40000"/>
-                <a:satMod val="350000"/>
-              </a:schemeClr>
-            </a:gs>
-            <a:gs pos="40000">
-              <a:schemeClr val="phClr">
-                <a:tint val="45000"/>
-                <a:shade val="99000"/>
-                <a:satMod val="350000"/>
-              </a:schemeClr>
-            </a:gs>
-            <a:gs pos="100000">
-              <a:schemeClr val="phClr">
-                <a:shade val="20000"/>
-                <a:satMod val="255000"/>
-              </a:schemeClr>
-            </a:gs>
-          </a:gsLst>
-          <a:path path="circle">
-            <a:fillToRect l="50000" t="-80000" r="50000" b="180000"/>
-          </a:path>
-        </a:gradFill>
-        <a:gradFill rotWithShape="1">
-          <a:gsLst>
-            <a:gs pos="0">
-              <a:schemeClr val="phClr">
-                <a:tint val="80000"/>
-                <a:satMod val="300000"/>
-              </a:schemeClr>
-            </a:gs>
-            <a:gs pos="100000">
-              <a:schemeClr val="phClr">
-                <a:shade val="30000"/>
-                <a:satMod val="200000"/>
-              </a:schemeClr>
-            </a:gs>
-          </a:gsLst>
-          <a:path path="circle">
-            <a:fillToRect l="50000" t="50000" r="50000" b="50000"/>
-          </a:path>
-        </a:gradFill>
-      </a:bgFillStyleLst>
-    </a:fmtScheme>
-  </a:themeElements>
-  <a:objectDefaults>
-    <a:spDef>
-      <a:spPr/>
-      <a:bodyPr/>
-      <a:lstStyle/>
-      <a:style>
-        <a:lnRef idx="1">
-          <a:schemeClr val="accent1"/>
-        </a:lnRef>
-        <a:fillRef idx="3">
-          <a:schemeClr val="accent1"/>
-        </a:fillRef>
-        <a:effectRef idx="2">
-          <a:schemeClr val="accent1"/>
-        </a:effectRef>
-        <a:fontRef idx="minor">
-          <a:schemeClr val="lt1"/>
-        </a:fontRef>
-      </a:style>
-    </a:spDef>
-    <a:lnDef>
-      <a:spPr/>
-      <a:bodyPr/>
-      <a:lstStyle/>
-      <a:style>
-        <a:lnRef idx="2">
-          <a:schemeClr val="accent1"/>
-        </a:lnRef>
-        <a:fillRef idx="0">
-          <a:schemeClr val="accent1"/>
-        </a:fillRef>
-        <a:effectRef idx="1">
-          <a:schemeClr val="accent1"/>
-        </a:effectRef>
-        <a:fontRef idx="minor">
-          <a:schemeClr val="tx1"/>
-        </a:fontRef>
-      </a:style>
-    </a:lnDef>
-  </a:objectDefaults>
-  <a:extraClrSchemeLst/>
-</a:theme>
 </file>
</xml_diff>